<commit_message>
updated workflow, adding working resources files, updating cleaning process Twitter_Vader_sentiment_analysis.ipynb
</commit_message>
<xml_diff>
--- a/flowchart.pptx
+++ b/flowchart.pptx
@@ -259,7 +259,7 @@
           <a:p>
             <a:fld id="{E700A6F8-1C47-4BB8-A7F5-CF2765752BCF}" type="datetimeFigureOut">
               <a:rPr lang="en-US" smtClean="0"/>
-              <a:t>3/19/2022</a:t>
+              <a:t>3/20/2022</a:t>
             </a:fld>
             <a:endParaRPr lang="en-US"/>
           </a:p>
@@ -457,7 +457,7 @@
           <a:p>
             <a:fld id="{E700A6F8-1C47-4BB8-A7F5-CF2765752BCF}" type="datetimeFigureOut">
               <a:rPr lang="en-US" smtClean="0"/>
-              <a:t>3/19/2022</a:t>
+              <a:t>3/20/2022</a:t>
             </a:fld>
             <a:endParaRPr lang="en-US"/>
           </a:p>
@@ -665,7 +665,7 @@
           <a:p>
             <a:fld id="{E700A6F8-1C47-4BB8-A7F5-CF2765752BCF}" type="datetimeFigureOut">
               <a:rPr lang="en-US" smtClean="0"/>
-              <a:t>3/19/2022</a:t>
+              <a:t>3/20/2022</a:t>
             </a:fld>
             <a:endParaRPr lang="en-US"/>
           </a:p>
@@ -863,7 +863,7 @@
           <a:p>
             <a:fld id="{E700A6F8-1C47-4BB8-A7F5-CF2765752BCF}" type="datetimeFigureOut">
               <a:rPr lang="en-US" smtClean="0"/>
-              <a:t>3/19/2022</a:t>
+              <a:t>3/20/2022</a:t>
             </a:fld>
             <a:endParaRPr lang="en-US"/>
           </a:p>
@@ -1138,7 +1138,7 @@
           <a:p>
             <a:fld id="{E700A6F8-1C47-4BB8-A7F5-CF2765752BCF}" type="datetimeFigureOut">
               <a:rPr lang="en-US" smtClean="0"/>
-              <a:t>3/19/2022</a:t>
+              <a:t>3/20/2022</a:t>
             </a:fld>
             <a:endParaRPr lang="en-US"/>
           </a:p>
@@ -1403,7 +1403,7 @@
           <a:p>
             <a:fld id="{E700A6F8-1C47-4BB8-A7F5-CF2765752BCF}" type="datetimeFigureOut">
               <a:rPr lang="en-US" smtClean="0"/>
-              <a:t>3/19/2022</a:t>
+              <a:t>3/20/2022</a:t>
             </a:fld>
             <a:endParaRPr lang="en-US"/>
           </a:p>
@@ -1815,7 +1815,7 @@
           <a:p>
             <a:fld id="{E700A6F8-1C47-4BB8-A7F5-CF2765752BCF}" type="datetimeFigureOut">
               <a:rPr lang="en-US" smtClean="0"/>
-              <a:t>3/19/2022</a:t>
+              <a:t>3/20/2022</a:t>
             </a:fld>
             <a:endParaRPr lang="en-US"/>
           </a:p>
@@ -1956,7 +1956,7 @@
           <a:p>
             <a:fld id="{E700A6F8-1C47-4BB8-A7F5-CF2765752BCF}" type="datetimeFigureOut">
               <a:rPr lang="en-US" smtClean="0"/>
-              <a:t>3/19/2022</a:t>
+              <a:t>3/20/2022</a:t>
             </a:fld>
             <a:endParaRPr lang="en-US"/>
           </a:p>
@@ -2069,7 +2069,7 @@
           <a:p>
             <a:fld id="{E700A6F8-1C47-4BB8-A7F5-CF2765752BCF}" type="datetimeFigureOut">
               <a:rPr lang="en-US" smtClean="0"/>
-              <a:t>3/19/2022</a:t>
+              <a:t>3/20/2022</a:t>
             </a:fld>
             <a:endParaRPr lang="en-US"/>
           </a:p>
@@ -2380,7 +2380,7 @@
           <a:p>
             <a:fld id="{E700A6F8-1C47-4BB8-A7F5-CF2765752BCF}" type="datetimeFigureOut">
               <a:rPr lang="en-US" smtClean="0"/>
-              <a:t>3/19/2022</a:t>
+              <a:t>3/20/2022</a:t>
             </a:fld>
             <a:endParaRPr lang="en-US"/>
           </a:p>
@@ -2668,7 +2668,7 @@
           <a:p>
             <a:fld id="{E700A6F8-1C47-4BB8-A7F5-CF2765752BCF}" type="datetimeFigureOut">
               <a:rPr lang="en-US" smtClean="0"/>
-              <a:t>3/19/2022</a:t>
+              <a:t>3/20/2022</a:t>
             </a:fld>
             <a:endParaRPr lang="en-US"/>
           </a:p>
@@ -2909,7 +2909,7 @@
           <a:p>
             <a:fld id="{E700A6F8-1C47-4BB8-A7F5-CF2765752BCF}" type="datetimeFigureOut">
               <a:rPr lang="en-US" smtClean="0"/>
-              <a:t>3/19/2022</a:t>
+              <a:t>3/20/2022</a:t>
             </a:fld>
             <a:endParaRPr lang="en-US"/>
           </a:p>
@@ -3382,10 +3382,45 @@
       </p:sp>
       <p:sp>
         <p:nvSpPr>
-          <p:cNvPr id="5" name="Flowchart: Process 4">
-            <a:extLst>
-              <a:ext uri="{FF2B5EF4-FFF2-40B4-BE49-F238E27FC236}">
-                <a16:creationId xmlns:a16="http://schemas.microsoft.com/office/drawing/2014/main" id="{6B3CEE45-B94F-4665-8418-819774A08E77}"/>
+          <p:cNvPr id="7" name="TextBox 6">
+            <a:extLst>
+              <a:ext uri="{FF2B5EF4-FFF2-40B4-BE49-F238E27FC236}">
+                <a16:creationId xmlns:a16="http://schemas.microsoft.com/office/drawing/2014/main" id="{631024F8-3746-49E4-80EC-79FE8C3C89F1}"/>
+              </a:ext>
+            </a:extLst>
+          </p:cNvPr>
+          <p:cNvSpPr txBox="1"/>
+          <p:nvPr/>
+        </p:nvSpPr>
+        <p:spPr>
+          <a:xfrm>
+            <a:off x="4757270" y="231962"/>
+            <a:ext cx="2649508" cy="369332"/>
+          </a:xfrm>
+          <a:prstGeom prst="rect">
+            <a:avLst/>
+          </a:prstGeom>
+          <a:noFill/>
+        </p:spPr>
+        <p:txBody>
+          <a:bodyPr wrap="none" rtlCol="0">
+            <a:spAutoFit/>
+          </a:bodyPr>
+          <a:lstStyle/>
+          <a:p>
+            <a:r>
+              <a:rPr lang="en-US" dirty="0"/>
+              <a:t>Data Processing Flowchart</a:t>
+            </a:r>
+          </a:p>
+        </p:txBody>
+      </p:sp>
+      <p:sp>
+        <p:nvSpPr>
+          <p:cNvPr id="8" name="Flowchart: Process 7">
+            <a:extLst>
+              <a:ext uri="{FF2B5EF4-FFF2-40B4-BE49-F238E27FC236}">
+                <a16:creationId xmlns:a16="http://schemas.microsoft.com/office/drawing/2014/main" id="{15C018F6-05C9-493C-8A0C-2F3ED7BCF736}"/>
               </a:ext>
             </a:extLst>
           </p:cNvPr>
@@ -3394,7 +3429,7 @@
         </p:nvSpPr>
         <p:spPr>
           <a:xfrm>
-            <a:off x="2204576" y="910858"/>
+            <a:off x="4788341" y="863907"/>
             <a:ext cx="1655805" cy="1044256"/>
           </a:xfrm>
           <a:prstGeom prst="flowChartProcess">
@@ -3421,65 +3456,33 @@
           <a:p>
             <a:pPr algn="ctr"/>
             <a:r>
-              <a:rPr lang="en-US" sz="1200" dirty="0"/>
-              <a:t>Filter by English Language &amp; Prune Columns</a:t>
+              <a:rPr lang="en-US" sz="1400" dirty="0"/>
+              <a:t>Preprocessing</a:t>
             </a:r>
           </a:p>
           <a:p>
             <a:pPr algn="ctr"/>
             <a:r>
               <a:rPr lang="en-US" sz="1100" dirty="0"/>
-              <a:t>___.</a:t>
-            </a:r>
-            <a:r>
-              <a:rPr lang="en-US" sz="1100" dirty="0" err="1"/>
-              <a:t>ipynb</a:t>
-            </a:r>
-            <a:endParaRPr lang="en-US" sz="1100" dirty="0"/>
-          </a:p>
-        </p:txBody>
-      </p:sp>
-      <p:sp>
-        <p:nvSpPr>
-          <p:cNvPr id="7" name="TextBox 6">
-            <a:extLst>
-              <a:ext uri="{FF2B5EF4-FFF2-40B4-BE49-F238E27FC236}">
-                <a16:creationId xmlns:a16="http://schemas.microsoft.com/office/drawing/2014/main" id="{631024F8-3746-49E4-80EC-79FE8C3C89F1}"/>
-              </a:ext>
-            </a:extLst>
-          </p:cNvPr>
-          <p:cNvSpPr txBox="1"/>
-          <p:nvPr/>
-        </p:nvSpPr>
-        <p:spPr>
-          <a:xfrm>
-            <a:off x="4757270" y="231962"/>
-            <a:ext cx="2649508" cy="369332"/>
-          </a:xfrm>
-          <a:prstGeom prst="rect">
-            <a:avLst/>
-          </a:prstGeom>
-          <a:noFill/>
-        </p:spPr>
-        <p:txBody>
-          <a:bodyPr wrap="none" rtlCol="0">
-            <a:spAutoFit/>
-          </a:bodyPr>
-          <a:lstStyle/>
-          <a:p>
-            <a:r>
-              <a:rPr lang="en-US" dirty="0"/>
-              <a:t>Data Processing Flowchart</a:t>
-            </a:r>
-          </a:p>
-        </p:txBody>
-      </p:sp>
-      <p:sp>
-        <p:nvSpPr>
-          <p:cNvPr id="8" name="Flowchart: Process 7">
-            <a:extLst>
-              <a:ext uri="{FF2B5EF4-FFF2-40B4-BE49-F238E27FC236}">
-                <a16:creationId xmlns:a16="http://schemas.microsoft.com/office/drawing/2014/main" id="{15C018F6-05C9-493C-8A0C-2F3ED7BCF736}"/>
+              <a:t>Filter by English lang, cleaning, convert location to country, add Lat &amp; Lon</a:t>
+            </a:r>
+          </a:p>
+          <a:p>
+            <a:pPr algn="ctr"/>
+            <a:r>
+              <a:rPr lang="en-US" sz="900" dirty="0" err="1"/>
+              <a:t>Twitter_vader_sentiment_analysis.ipynb</a:t>
+            </a:r>
+            <a:endParaRPr lang="en-US" sz="900" dirty="0"/>
+          </a:p>
+        </p:txBody>
+      </p:sp>
+      <p:sp>
+        <p:nvSpPr>
+          <p:cNvPr id="10" name="Flowchart: Process 9">
+            <a:extLst>
+              <a:ext uri="{FF2B5EF4-FFF2-40B4-BE49-F238E27FC236}">
+                <a16:creationId xmlns:a16="http://schemas.microsoft.com/office/drawing/2014/main" id="{335CBE6D-6AC5-4A99-B8CC-8C6E482A21EA}"/>
               </a:ext>
             </a:extLst>
           </p:cNvPr>
@@ -3488,7 +3491,7 @@
         </p:nvSpPr>
         <p:spPr>
           <a:xfrm>
-            <a:off x="6022912" y="910858"/>
+            <a:off x="10011422" y="910858"/>
             <a:ext cx="1655805" cy="1044256"/>
           </a:xfrm>
           <a:prstGeom prst="flowChartProcess">
@@ -3516,36 +3519,29 @@
             <a:pPr algn="ctr"/>
             <a:r>
               <a:rPr lang="en-US" sz="1400" dirty="0"/>
-              <a:t>Preprocessing</a:t>
+              <a:t>Sentiment Analysis</a:t>
             </a:r>
           </a:p>
           <a:p>
             <a:pPr algn="ctr"/>
             <a:r>
-              <a:rPr lang="en-US" sz="1100" dirty="0"/>
-              <a:t>cleaning, convert location to country, add Lat &amp; Lon</a:t>
-            </a:r>
+              <a:rPr lang="en-US" sz="900" dirty="0" err="1"/>
+              <a:t>Twitter_Vader_sentiment_analysis.ipynb</a:t>
+            </a:r>
+            <a:endParaRPr lang="en-US" sz="900" dirty="0"/>
           </a:p>
           <a:p>
             <a:pPr algn="ctr"/>
-            <a:r>
-              <a:rPr lang="en-US" sz="1100" dirty="0"/>
-              <a:t>_____.</a:t>
-            </a:r>
-            <a:r>
-              <a:rPr lang="en-US" sz="1100" dirty="0" err="1"/>
-              <a:t>ipynb</a:t>
-            </a:r>
             <a:endParaRPr lang="en-US" sz="1100" dirty="0"/>
           </a:p>
         </p:txBody>
       </p:sp>
       <p:sp>
         <p:nvSpPr>
-          <p:cNvPr id="10" name="Flowchart: Process 9">
-            <a:extLst>
-              <a:ext uri="{FF2B5EF4-FFF2-40B4-BE49-F238E27FC236}">
-                <a16:creationId xmlns:a16="http://schemas.microsoft.com/office/drawing/2014/main" id="{335CBE6D-6AC5-4A99-B8CC-8C6E482A21EA}"/>
+          <p:cNvPr id="12" name="Flowchart: Document 11">
+            <a:extLst>
+              <a:ext uri="{FF2B5EF4-FFF2-40B4-BE49-F238E27FC236}">
+                <a16:creationId xmlns:a16="http://schemas.microsoft.com/office/drawing/2014/main" id="{3DED4EBD-884C-4A6F-9C97-A59041FDEAD1}"/>
               </a:ext>
             </a:extLst>
           </p:cNvPr>
@@ -3554,10 +3550,10 @@
         </p:nvSpPr>
         <p:spPr>
           <a:xfrm>
-            <a:off x="10011422" y="910858"/>
-            <a:ext cx="1655805" cy="1044256"/>
-          </a:xfrm>
-          <a:prstGeom prst="flowChartProcess">
+            <a:off x="338886" y="3644956"/>
+            <a:ext cx="1079700" cy="622225"/>
+          </a:xfrm>
+          <a:prstGeom prst="flowChartDocument">
             <a:avLst/>
           </a:prstGeom>
         </p:spPr>
@@ -3581,34 +3577,19 @@
           <a:p>
             <a:pPr algn="ctr"/>
             <a:r>
-              <a:rPr lang="en-US" sz="1400" dirty="0"/>
-              <a:t>Sentiment Analysis</a:t>
-            </a:r>
-          </a:p>
-          <a:p>
-            <a:pPr algn="ctr"/>
-            <a:r>
-              <a:rPr lang="en-US" sz="1100" dirty="0"/>
-              <a:t>____.</a:t>
-            </a:r>
-            <a:r>
-              <a:rPr lang="en-US" sz="1100" dirty="0" err="1"/>
-              <a:t>ipynb</a:t>
-            </a:r>
-            <a:endParaRPr lang="en-US" sz="1100" dirty="0"/>
-          </a:p>
-          <a:p>
-            <a:pPr algn="ctr"/>
-            <a:endParaRPr lang="en-US" sz="1100" dirty="0"/>
-          </a:p>
-        </p:txBody>
-      </p:sp>
-      <p:sp>
-        <p:nvSpPr>
-          <p:cNvPr id="11" name="Flowchart: Document 10">
-            <a:extLst>
-              <a:ext uri="{FF2B5EF4-FFF2-40B4-BE49-F238E27FC236}">
-                <a16:creationId xmlns:a16="http://schemas.microsoft.com/office/drawing/2014/main" id="{8F86FB86-5A35-4213-B45B-28435E4CA9C6}"/>
+              <a:rPr lang="en-US" sz="1000" dirty="0" err="1"/>
+              <a:t>schema.sql</a:t>
+            </a:r>
+            <a:endParaRPr lang="en-US" sz="1000" dirty="0"/>
+          </a:p>
+        </p:txBody>
+      </p:sp>
+      <p:sp>
+        <p:nvSpPr>
+          <p:cNvPr id="13" name="Flowchart: Process 12">
+            <a:extLst>
+              <a:ext uri="{FF2B5EF4-FFF2-40B4-BE49-F238E27FC236}">
+                <a16:creationId xmlns:a16="http://schemas.microsoft.com/office/drawing/2014/main" id="{F8F50C93-FB12-4705-8C29-2B4C5F1372DD}"/>
               </a:ext>
             </a:extLst>
           </p:cNvPr>
@@ -3617,10 +3598,10 @@
         </p:nvSpPr>
         <p:spPr>
           <a:xfrm>
-            <a:off x="4310332" y="1121873"/>
-            <a:ext cx="1019152" cy="622225"/>
-          </a:xfrm>
-          <a:prstGeom prst="flowChartDocument">
+            <a:off x="10223039" y="3818566"/>
+            <a:ext cx="1655805" cy="1044256"/>
+          </a:xfrm>
+          <a:prstGeom prst="flowChartProcess">
             <a:avLst/>
           </a:prstGeom>
         </p:spPr>
@@ -3644,18 +3625,33 @@
           <a:p>
             <a:pPr algn="ctr"/>
             <a:r>
-              <a:rPr lang="en-US" sz="1000" dirty="0"/>
-              <a:t>en_tweets.csv</a:t>
-            </a:r>
-          </a:p>
-        </p:txBody>
-      </p:sp>
-      <p:sp>
-        <p:nvSpPr>
-          <p:cNvPr id="12" name="Flowchart: Document 11">
-            <a:extLst>
-              <a:ext uri="{FF2B5EF4-FFF2-40B4-BE49-F238E27FC236}">
-                <a16:creationId xmlns:a16="http://schemas.microsoft.com/office/drawing/2014/main" id="{3DED4EBD-884C-4A6F-9C97-A59041FDEAD1}"/>
+              <a:rPr lang="en-US" sz="1400" dirty="0"/>
+              <a:t>ML</a:t>
+            </a:r>
+          </a:p>
+          <a:p>
+            <a:pPr algn="ctr"/>
+            <a:r>
+              <a:rPr lang="en-US" sz="1400" dirty="0"/>
+              <a:t>3-model comparison</a:t>
+            </a:r>
+          </a:p>
+          <a:p>
+            <a:pPr algn="ctr"/>
+            <a:r>
+              <a:rPr lang="en-US" sz="1100" dirty="0" err="1"/>
+              <a:t>Machine_Learning.ipynb</a:t>
+            </a:r>
+            <a:endParaRPr lang="en-US" sz="1100" dirty="0"/>
+          </a:p>
+        </p:txBody>
+      </p:sp>
+      <p:sp>
+        <p:nvSpPr>
+          <p:cNvPr id="14" name="Flowchart: Document 13">
+            <a:extLst>
+              <a:ext uri="{FF2B5EF4-FFF2-40B4-BE49-F238E27FC236}">
+                <a16:creationId xmlns:a16="http://schemas.microsoft.com/office/drawing/2014/main" id="{5FBAC688-31CC-4F05-8905-71B21636DAB9}"/>
               </a:ext>
             </a:extLst>
           </p:cNvPr>
@@ -3664,8 +3660,8 @@
         </p:nvSpPr>
         <p:spPr>
           <a:xfrm>
-            <a:off x="1566502" y="4185129"/>
-            <a:ext cx="1079700" cy="622225"/>
+            <a:off x="10047579" y="2630433"/>
+            <a:ext cx="1186934" cy="641071"/>
           </a:xfrm>
           <a:prstGeom prst="flowChartDocument">
             <a:avLst/>
@@ -3691,119 +3687,17 @@
           <a:p>
             <a:pPr algn="ctr"/>
             <a:r>
+              <a:rPr lang="en-US" sz="1000" dirty="0"/>
+              <a:t>Tweets_data.csv</a:t>
+            </a:r>
+          </a:p>
+          <a:p>
+            <a:pPr algn="ctr"/>
+            <a:r>
               <a:rPr lang="en-US" sz="1000" dirty="0" err="1"/>
-              <a:t>schema.sql</a:t>
+              <a:t>Tweets_data.sqlite</a:t>
             </a:r>
             <a:endParaRPr lang="en-US" sz="1000" dirty="0"/>
-          </a:p>
-        </p:txBody>
-      </p:sp>
-      <p:sp>
-        <p:nvSpPr>
-          <p:cNvPr id="13" name="Flowchart: Process 12">
-            <a:extLst>
-              <a:ext uri="{FF2B5EF4-FFF2-40B4-BE49-F238E27FC236}">
-                <a16:creationId xmlns:a16="http://schemas.microsoft.com/office/drawing/2014/main" id="{F8F50C93-FB12-4705-8C29-2B4C5F1372DD}"/>
-              </a:ext>
-            </a:extLst>
-          </p:cNvPr>
-          <p:cNvSpPr/>
-          <p:nvPr/>
-        </p:nvSpPr>
-        <p:spPr>
-          <a:xfrm>
-            <a:off x="10223039" y="3818566"/>
-            <a:ext cx="1655805" cy="1044256"/>
-          </a:xfrm>
-          <a:prstGeom prst="flowChartProcess">
-            <a:avLst/>
-          </a:prstGeom>
-        </p:spPr>
-        <p:style>
-          <a:lnRef idx="2">
-            <a:schemeClr val="accent1"/>
-          </a:lnRef>
-          <a:fillRef idx="1">
-            <a:schemeClr val="lt1"/>
-          </a:fillRef>
-          <a:effectRef idx="0">
-            <a:schemeClr val="accent1"/>
-          </a:effectRef>
-          <a:fontRef idx="minor">
-            <a:schemeClr val="dk1"/>
-          </a:fontRef>
-        </p:style>
-        <p:txBody>
-          <a:bodyPr rtlCol="0" anchor="ctr"/>
-          <a:lstStyle/>
-          <a:p>
-            <a:pPr algn="ctr"/>
-            <a:r>
-              <a:rPr lang="en-US" sz="1400" dirty="0"/>
-              <a:t>ML</a:t>
-            </a:r>
-          </a:p>
-          <a:p>
-            <a:pPr algn="ctr"/>
-            <a:r>
-              <a:rPr lang="en-US" sz="1400" dirty="0"/>
-              <a:t>3-model comparison</a:t>
-            </a:r>
-          </a:p>
-          <a:p>
-            <a:pPr algn="ctr"/>
-            <a:r>
-              <a:rPr lang="en-US" sz="1100" dirty="0" err="1"/>
-              <a:t>Machine_Learning.ipynb</a:t>
-            </a:r>
-            <a:endParaRPr lang="en-US" sz="1100" dirty="0"/>
-          </a:p>
-        </p:txBody>
-      </p:sp>
-      <p:sp>
-        <p:nvSpPr>
-          <p:cNvPr id="14" name="Flowchart: Document 13">
-            <a:extLst>
-              <a:ext uri="{FF2B5EF4-FFF2-40B4-BE49-F238E27FC236}">
-                <a16:creationId xmlns:a16="http://schemas.microsoft.com/office/drawing/2014/main" id="{5FBAC688-31CC-4F05-8905-71B21636DAB9}"/>
-              </a:ext>
-            </a:extLst>
-          </p:cNvPr>
-          <p:cNvSpPr/>
-          <p:nvPr/>
-        </p:nvSpPr>
-        <p:spPr>
-          <a:xfrm>
-            <a:off x="10047579" y="2630433"/>
-            <a:ext cx="1186934" cy="641071"/>
-          </a:xfrm>
-          <a:prstGeom prst="flowChartDocument">
-            <a:avLst/>
-          </a:prstGeom>
-        </p:spPr>
-        <p:style>
-          <a:lnRef idx="2">
-            <a:schemeClr val="accent1"/>
-          </a:lnRef>
-          <a:fillRef idx="1">
-            <a:schemeClr val="lt1"/>
-          </a:fillRef>
-          <a:effectRef idx="0">
-            <a:schemeClr val="accent1"/>
-          </a:effectRef>
-          <a:fontRef idx="minor">
-            <a:schemeClr val="dk1"/>
-          </a:fontRef>
-        </p:style>
-        <p:txBody>
-          <a:bodyPr rtlCol="0" anchor="ctr"/>
-          <a:lstStyle/>
-          <a:p>
-            <a:pPr algn="ctr"/>
-            <a:r>
-              <a:rPr lang="en-US" sz="1000" dirty="0"/>
-              <a:t>cleaned_data_plus_sentiments.csv</a:t>
-            </a:r>
           </a:p>
         </p:txBody>
       </p:sp>
@@ -4143,8 +4037,8 @@
         </p:nvSpPr>
         <p:spPr>
           <a:xfrm>
-            <a:off x="478295" y="2408726"/>
-            <a:ext cx="1312338" cy="966642"/>
+            <a:off x="312255" y="2223335"/>
+            <a:ext cx="1543907" cy="966642"/>
           </a:xfrm>
           <a:prstGeom prst="flowChartDocument">
             <a:avLst/>
@@ -4178,7 +4072,14 @@
             <a:pPr algn="ctr"/>
             <a:r>
               <a:rPr lang="en-US" sz="900" dirty="0"/>
-              <a:t>Migration, casualties, military expenditures</a:t>
+              <a:t>Russia_losses_personnel.csv</a:t>
+            </a:r>
+          </a:p>
+          <a:p>
+            <a:pPr algn="ctr"/>
+            <a:r>
+              <a:rPr lang="en-US" sz="900" dirty="0"/>
+              <a:t>Russia_losses_equipment_total.csv</a:t>
             </a:r>
           </a:p>
         </p:txBody>
@@ -4197,7 +4098,7 @@
         </p:nvSpPr>
         <p:spPr>
           <a:xfrm>
-            <a:off x="2459460" y="2384744"/>
+            <a:off x="2503056" y="2023578"/>
             <a:ext cx="1655805" cy="1044256"/>
           </a:xfrm>
           <a:prstGeom prst="flowChartProcess">
@@ -4246,13 +4147,15 @@
               </a:ext>
             </a:extLst>
           </p:cNvPr>
-          <p:cNvCxnSpPr/>
+          <p:cNvCxnSpPr>
+            <a:cxnSpLocks/>
+          </p:cNvCxnSpPr>
           <p:nvPr/>
         </p:nvCxnSpPr>
         <p:spPr>
           <a:xfrm>
             <a:off x="1877486" y="1351824"/>
-            <a:ext cx="248890" cy="0"/>
+            <a:ext cx="2525762" cy="0"/>
           </a:xfrm>
           <a:prstGeom prst="straightConnector1">
             <a:avLst/>
@@ -4285,13 +4188,15 @@
               </a:ext>
             </a:extLst>
           </p:cNvPr>
-          <p:cNvCxnSpPr/>
+          <p:cNvCxnSpPr>
+            <a:cxnSpLocks/>
+          </p:cNvCxnSpPr>
           <p:nvPr/>
         </p:nvCxnSpPr>
         <p:spPr>
           <a:xfrm>
-            <a:off x="7813872" y="1351824"/>
-            <a:ext cx="248890" cy="0"/>
+            <a:off x="6537676" y="1351824"/>
+            <a:ext cx="750053" cy="0"/>
           </a:xfrm>
           <a:prstGeom prst="straightConnector1">
             <a:avLst/>
@@ -4324,91 +4229,15 @@
               </a:ext>
             </a:extLst>
           </p:cNvPr>
-          <p:cNvCxnSpPr/>
+          <p:cNvCxnSpPr>
+            <a:cxnSpLocks/>
+          </p:cNvCxnSpPr>
           <p:nvPr/>
         </p:nvCxnSpPr>
         <p:spPr>
           <a:xfrm>
-            <a:off x="9601021" y="1394179"/>
-            <a:ext cx="248890" cy="0"/>
-          </a:xfrm>
-          <a:prstGeom prst="straightConnector1">
-            <a:avLst/>
-          </a:prstGeom>
-          <a:ln>
-            <a:tailEnd type="triangle"/>
-          </a:ln>
-        </p:spPr>
-        <p:style>
-          <a:lnRef idx="1">
-            <a:schemeClr val="accent1"/>
-          </a:lnRef>
-          <a:fillRef idx="0">
-            <a:schemeClr val="accent1"/>
-          </a:fillRef>
-          <a:effectRef idx="0">
-            <a:schemeClr val="accent1"/>
-          </a:effectRef>
-          <a:fontRef idx="minor">
-            <a:schemeClr val="tx1"/>
-          </a:fontRef>
-        </p:style>
-      </p:cxnSp>
-      <p:cxnSp>
-        <p:nvCxnSpPr>
-          <p:cNvPr id="50" name="Straight Arrow Connector 49">
-            <a:extLst>
-              <a:ext uri="{FF2B5EF4-FFF2-40B4-BE49-F238E27FC236}">
-                <a16:creationId xmlns:a16="http://schemas.microsoft.com/office/drawing/2014/main" id="{5CEE9240-7109-41E3-B4AD-3408F8C9E540}"/>
-              </a:ext>
-            </a:extLst>
-          </p:cNvPr>
-          <p:cNvCxnSpPr/>
-          <p:nvPr/>
-        </p:nvCxnSpPr>
-        <p:spPr>
-          <a:xfrm>
-            <a:off x="5575666" y="1351824"/>
-            <a:ext cx="248890" cy="0"/>
-          </a:xfrm>
-          <a:prstGeom prst="straightConnector1">
-            <a:avLst/>
-          </a:prstGeom>
-          <a:ln>
-            <a:tailEnd type="triangle"/>
-          </a:ln>
-        </p:spPr>
-        <p:style>
-          <a:lnRef idx="1">
-            <a:schemeClr val="accent1"/>
-          </a:lnRef>
-          <a:fillRef idx="0">
-            <a:schemeClr val="accent1"/>
-          </a:fillRef>
-          <a:effectRef idx="0">
-            <a:schemeClr val="accent1"/>
-          </a:effectRef>
-          <a:fontRef idx="minor">
-            <a:schemeClr val="tx1"/>
-          </a:fontRef>
-        </p:style>
-      </p:cxnSp>
-      <p:cxnSp>
-        <p:nvCxnSpPr>
-          <p:cNvPr id="51" name="Straight Arrow Connector 50">
-            <a:extLst>
-              <a:ext uri="{FF2B5EF4-FFF2-40B4-BE49-F238E27FC236}">
-                <a16:creationId xmlns:a16="http://schemas.microsoft.com/office/drawing/2014/main" id="{E52542DD-5639-4D98-A727-74358655C387}"/>
-              </a:ext>
-            </a:extLst>
-          </p:cNvPr>
-          <p:cNvCxnSpPr/>
-          <p:nvPr/>
-        </p:nvCxnSpPr>
-        <p:spPr>
-          <a:xfrm>
-            <a:off x="3920909" y="1351824"/>
-            <a:ext cx="248890" cy="0"/>
+            <a:off x="8849665" y="1394179"/>
+            <a:ext cx="1000246" cy="0"/>
           </a:xfrm>
           <a:prstGeom prst="straightConnector1">
             <a:avLst/>
@@ -4446,7 +4275,7 @@
         </p:nvCxnSpPr>
         <p:spPr>
           <a:xfrm>
-            <a:off x="1949993" y="2837940"/>
+            <a:off x="2083425" y="2594623"/>
             <a:ext cx="248890" cy="0"/>
           </a:xfrm>
           <a:prstGeom prst="straightConnector1">
@@ -4485,7 +4314,7 @@
         </p:nvSpPr>
         <p:spPr>
           <a:xfrm>
-            <a:off x="3041392" y="4172445"/>
+            <a:off x="5374387" y="3485088"/>
             <a:ext cx="1163289" cy="678406"/>
           </a:xfrm>
           <a:prstGeom prst="flowChartMagneticDisk">
@@ -4513,7 +4342,7 @@
             <a:pPr algn="ctr"/>
             <a:r>
               <a:rPr lang="en-US" sz="1200" dirty="0"/>
-              <a:t>SQLite </a:t>
+              <a:t>Postgres </a:t>
             </a:r>
             <a:r>
               <a:rPr lang="en-US" sz="1200" dirty="0" err="1"/>
@@ -4537,7 +4366,7 @@
         </p:nvSpPr>
         <p:spPr>
           <a:xfrm>
-            <a:off x="8305219" y="1083066"/>
+            <a:off x="7456581" y="1083066"/>
             <a:ext cx="1079700" cy="622225"/>
           </a:xfrm>
           <a:prstGeom prst="flowChartDocument">
@@ -4588,8 +4417,8 @@
         </p:nvCxnSpPr>
         <p:spPr>
           <a:xfrm rot="5400000">
-            <a:off x="2318794" y="3216559"/>
-            <a:ext cx="756129" cy="1181011"/>
+            <a:off x="1816287" y="2130284"/>
+            <a:ext cx="577122" cy="2452223"/>
           </a:xfrm>
           <a:prstGeom prst="bentConnector3">
             <a:avLst/>
@@ -4630,11 +4459,13 @@
         </p:nvCxnSpPr>
         <p:spPr>
           <a:xfrm rot="16200000" flipH="1">
-            <a:off x="3083478" y="3632885"/>
-            <a:ext cx="743445" cy="335674"/>
+            <a:off x="4434868" y="1963924"/>
+            <a:ext cx="417254" cy="2625073"/>
           </a:xfrm>
           <a:prstGeom prst="bentConnector3">
-            <a:avLst/>
+            <a:avLst>
+              <a:gd name="adj1" fmla="val 50000"/>
+            </a:avLst>
           </a:prstGeom>
           <a:ln>
             <a:tailEnd type="triangle"/>
@@ -4936,13 +4767,248 @@
               </a:ext>
             </a:extLst>
           </p:cNvPr>
-          <p:cNvCxnSpPr/>
+          <p:cNvCxnSpPr>
+            <a:cxnSpLocks/>
+          </p:cNvCxnSpPr>
           <p:nvPr/>
         </p:nvCxnSpPr>
         <p:spPr>
           <a:xfrm>
-            <a:off x="3725841" y="4934514"/>
-            <a:ext cx="0" cy="439524"/>
+            <a:off x="4471489" y="5173934"/>
+            <a:ext cx="0" cy="162556"/>
+          </a:xfrm>
+          <a:prstGeom prst="straightConnector1">
+            <a:avLst/>
+          </a:prstGeom>
+          <a:ln>
+            <a:tailEnd type="triangle"/>
+          </a:ln>
+        </p:spPr>
+        <p:style>
+          <a:lnRef idx="1">
+            <a:schemeClr val="accent1"/>
+          </a:lnRef>
+          <a:fillRef idx="0">
+            <a:schemeClr val="accent1"/>
+          </a:fillRef>
+          <a:effectRef idx="0">
+            <a:schemeClr val="accent1"/>
+          </a:effectRef>
+          <a:fontRef idx="minor">
+            <a:schemeClr val="tx1"/>
+          </a:fontRef>
+        </p:style>
+      </p:cxnSp>
+      <p:sp>
+        <p:nvSpPr>
+          <p:cNvPr id="43" name="Flowchart: Document 42">
+            <a:extLst>
+              <a:ext uri="{FF2B5EF4-FFF2-40B4-BE49-F238E27FC236}">
+                <a16:creationId xmlns:a16="http://schemas.microsoft.com/office/drawing/2014/main" id="{CF79B3E1-B72C-40EA-84CF-789A19DDE180}"/>
+              </a:ext>
+            </a:extLst>
+          </p:cNvPr>
+          <p:cNvSpPr/>
+          <p:nvPr/>
+        </p:nvSpPr>
+        <p:spPr>
+          <a:xfrm>
+            <a:off x="3863398" y="4421958"/>
+            <a:ext cx="1079700" cy="622225"/>
+          </a:xfrm>
+          <a:prstGeom prst="flowChartDocument">
+            <a:avLst/>
+          </a:prstGeom>
+        </p:spPr>
+        <p:style>
+          <a:lnRef idx="2">
+            <a:schemeClr val="accent1"/>
+          </a:lnRef>
+          <a:fillRef idx="1">
+            <a:schemeClr val="lt1"/>
+          </a:fillRef>
+          <a:effectRef idx="0">
+            <a:schemeClr val="accent1"/>
+          </a:effectRef>
+          <a:fontRef idx="minor">
+            <a:schemeClr val="dk1"/>
+          </a:fontRef>
+        </p:style>
+        <p:txBody>
+          <a:bodyPr rtlCol="0" anchor="ctr"/>
+          <a:lstStyle/>
+          <a:p>
+            <a:pPr algn="ctr"/>
+            <a:r>
+              <a:rPr lang="en-US" sz="1000" dirty="0" err="1"/>
+              <a:t>final_data.json</a:t>
+            </a:r>
+            <a:endParaRPr lang="en-US" sz="1000" dirty="0"/>
+          </a:p>
+        </p:txBody>
+      </p:sp>
+      <p:cxnSp>
+        <p:nvCxnSpPr>
+          <p:cNvPr id="20" name="Connector: Elbow 19">
+            <a:extLst>
+              <a:ext uri="{FF2B5EF4-FFF2-40B4-BE49-F238E27FC236}">
+                <a16:creationId xmlns:a16="http://schemas.microsoft.com/office/drawing/2014/main" id="{6769D071-2B8E-4029-BB8E-8360B3B8C2C7}"/>
+              </a:ext>
+            </a:extLst>
+          </p:cNvPr>
+          <p:cNvCxnSpPr>
+            <a:stCxn id="16" idx="2"/>
+          </p:cNvCxnSpPr>
+          <p:nvPr/>
+        </p:nvCxnSpPr>
+        <p:spPr>
+          <a:xfrm rot="5400000">
+            <a:off x="5270843" y="4981875"/>
+            <a:ext cx="493935" cy="1119482"/>
+          </a:xfrm>
+          <a:prstGeom prst="bentConnector2">
+            <a:avLst/>
+          </a:prstGeom>
+          <a:ln>
+            <a:tailEnd type="triangle"/>
+          </a:ln>
+        </p:spPr>
+        <p:style>
+          <a:lnRef idx="1">
+            <a:schemeClr val="accent1"/>
+          </a:lnRef>
+          <a:fillRef idx="0">
+            <a:schemeClr val="accent1"/>
+          </a:fillRef>
+          <a:effectRef idx="0">
+            <a:schemeClr val="accent1"/>
+          </a:effectRef>
+          <a:fontRef idx="minor">
+            <a:schemeClr val="tx1"/>
+          </a:fontRef>
+        </p:style>
+      </p:cxnSp>
+      <p:sp>
+        <p:nvSpPr>
+          <p:cNvPr id="24" name="Rectangle 23">
+            <a:extLst>
+              <a:ext uri="{FF2B5EF4-FFF2-40B4-BE49-F238E27FC236}">
+                <a16:creationId xmlns:a16="http://schemas.microsoft.com/office/drawing/2014/main" id="{B18962FF-4CAD-4C77-A380-0640DFB3D7A2}"/>
+              </a:ext>
+            </a:extLst>
+          </p:cNvPr>
+          <p:cNvSpPr/>
+          <p:nvPr/>
+        </p:nvSpPr>
+        <p:spPr>
+          <a:xfrm>
+            <a:off x="3709245" y="3545849"/>
+            <a:ext cx="1286856" cy="548427"/>
+          </a:xfrm>
+          <a:prstGeom prst="rect">
+            <a:avLst/>
+          </a:prstGeom>
+        </p:spPr>
+        <p:style>
+          <a:lnRef idx="2">
+            <a:schemeClr val="accent1"/>
+          </a:lnRef>
+          <a:fillRef idx="1">
+            <a:schemeClr val="lt1"/>
+          </a:fillRef>
+          <a:effectRef idx="0">
+            <a:schemeClr val="accent1"/>
+          </a:effectRef>
+          <a:fontRef idx="minor">
+            <a:schemeClr val="dk1"/>
+          </a:fontRef>
+        </p:style>
+        <p:txBody>
+          <a:bodyPr rtlCol="0" anchor="ctr"/>
+          <a:lstStyle/>
+          <a:p>
+            <a:pPr algn="ctr"/>
+            <a:r>
+              <a:rPr lang="en-US" sz="1200" dirty="0"/>
+              <a:t>Conversion</a:t>
+            </a:r>
+          </a:p>
+          <a:p>
+            <a:pPr algn="ctr"/>
+            <a:r>
+              <a:rPr lang="en-US" sz="900" dirty="0" err="1"/>
+              <a:t>final_data.ipynb</a:t>
+            </a:r>
+            <a:endParaRPr lang="en-US" sz="900" dirty="0"/>
+          </a:p>
+        </p:txBody>
+      </p:sp>
+      <p:sp>
+        <p:nvSpPr>
+          <p:cNvPr id="56" name="Flowchart: Document 55">
+            <a:extLst>
+              <a:ext uri="{FF2B5EF4-FFF2-40B4-BE49-F238E27FC236}">
+                <a16:creationId xmlns:a16="http://schemas.microsoft.com/office/drawing/2014/main" id="{EFAC2A6C-5D31-43CA-A1C0-EE55D560E4E4}"/>
+              </a:ext>
+            </a:extLst>
+          </p:cNvPr>
+          <p:cNvSpPr/>
+          <p:nvPr/>
+        </p:nvSpPr>
+        <p:spPr>
+          <a:xfrm>
+            <a:off x="2395914" y="4421958"/>
+            <a:ext cx="1079700" cy="622225"/>
+          </a:xfrm>
+          <a:prstGeom prst="flowChartDocument">
+            <a:avLst/>
+          </a:prstGeom>
+        </p:spPr>
+        <p:style>
+          <a:lnRef idx="2">
+            <a:schemeClr val="accent1"/>
+          </a:lnRef>
+          <a:fillRef idx="1">
+            <a:schemeClr val="lt1"/>
+          </a:fillRef>
+          <a:effectRef idx="0">
+            <a:schemeClr val="accent1"/>
+          </a:effectRef>
+          <a:fontRef idx="minor">
+            <a:schemeClr val="dk1"/>
+          </a:fontRef>
+        </p:style>
+        <p:txBody>
+          <a:bodyPr rtlCol="0" anchor="ctr"/>
+          <a:lstStyle/>
+          <a:p>
+            <a:pPr algn="ctr"/>
+            <a:r>
+              <a:rPr lang="en-US" sz="1000" dirty="0" err="1"/>
+              <a:t>final_data.sqlite</a:t>
+            </a:r>
+            <a:endParaRPr lang="en-US" sz="1000" dirty="0"/>
+          </a:p>
+        </p:txBody>
+      </p:sp>
+      <p:cxnSp>
+        <p:nvCxnSpPr>
+          <p:cNvPr id="34" name="Straight Arrow Connector 33">
+            <a:extLst>
+              <a:ext uri="{FF2B5EF4-FFF2-40B4-BE49-F238E27FC236}">
+                <a16:creationId xmlns:a16="http://schemas.microsoft.com/office/drawing/2014/main" id="{3E2A86F9-DC53-449C-AA75-8FA77CCEE70A}"/>
+              </a:ext>
+            </a:extLst>
+          </p:cNvPr>
+          <p:cNvCxnSpPr>
+            <a:stCxn id="54" idx="2"/>
+          </p:cNvCxnSpPr>
+          <p:nvPr/>
+        </p:nvCxnSpPr>
+        <p:spPr>
+          <a:xfrm flipH="1" flipV="1">
+            <a:off x="5063468" y="3818566"/>
+            <a:ext cx="310919" cy="5725"/>
           </a:xfrm>
           <a:prstGeom prst="straightConnector1">
             <a:avLst/>
@@ -4968,23 +5034,153 @@
       </p:cxnSp>
       <p:cxnSp>
         <p:nvCxnSpPr>
-          <p:cNvPr id="90" name="Connector: Elbow 89">
-            <a:extLst>
-              <a:ext uri="{FF2B5EF4-FFF2-40B4-BE49-F238E27FC236}">
-                <a16:creationId xmlns:a16="http://schemas.microsoft.com/office/drawing/2014/main" id="{74B20982-BCEE-4977-984F-CA02D5F29A17}"/>
+          <p:cNvPr id="36" name="Straight Arrow Connector 35">
+            <a:extLst>
+              <a:ext uri="{FF2B5EF4-FFF2-40B4-BE49-F238E27FC236}">
+                <a16:creationId xmlns:a16="http://schemas.microsoft.com/office/drawing/2014/main" id="{3EA800E5-DE97-4BEF-9BAA-168BC4202381}"/>
               </a:ext>
             </a:extLst>
           </p:cNvPr>
           <p:cNvCxnSpPr>
-            <a:stCxn id="16" idx="1"/>
-            <a:endCxn id="77" idx="0"/>
+            <a:stCxn id="24" idx="2"/>
           </p:cNvCxnSpPr>
           <p:nvPr/>
         </p:nvCxnSpPr>
         <p:spPr>
+          <a:xfrm>
+            <a:off x="4352673" y="4094276"/>
+            <a:ext cx="0" cy="218952"/>
+          </a:xfrm>
+          <a:prstGeom prst="straightConnector1">
+            <a:avLst/>
+          </a:prstGeom>
+          <a:ln>
+            <a:tailEnd type="triangle"/>
+          </a:ln>
+        </p:spPr>
+        <p:style>
+          <a:lnRef idx="1">
+            <a:schemeClr val="accent1"/>
+          </a:lnRef>
+          <a:fillRef idx="0">
+            <a:schemeClr val="accent1"/>
+          </a:fillRef>
+          <a:effectRef idx="0">
+            <a:schemeClr val="accent1"/>
+          </a:effectRef>
+          <a:fontRef idx="minor">
+            <a:schemeClr val="tx1"/>
+          </a:fontRef>
+        </p:style>
+      </p:cxnSp>
+      <p:cxnSp>
+        <p:nvCxnSpPr>
+          <p:cNvPr id="39" name="Connector: Elbow 38">
+            <a:extLst>
+              <a:ext uri="{FF2B5EF4-FFF2-40B4-BE49-F238E27FC236}">
+                <a16:creationId xmlns:a16="http://schemas.microsoft.com/office/drawing/2014/main" id="{637F8C8A-4847-442C-BBEA-BF9E957CFB17}"/>
+              </a:ext>
+            </a:extLst>
+          </p:cNvPr>
+          <p:cNvCxnSpPr>
+            <a:endCxn id="56" idx="0"/>
+          </p:cNvCxnSpPr>
+          <p:nvPr/>
+        </p:nvCxnSpPr>
+        <p:spPr>
           <a:xfrm rot="10800000" flipV="1">
-            <a:off x="4050774" y="4896967"/>
-            <a:ext cx="1198875" cy="598390"/>
+            <a:off x="2935764" y="4094276"/>
+            <a:ext cx="1115008" cy="327682"/>
+          </a:xfrm>
+          <a:prstGeom prst="bentConnector2">
+            <a:avLst/>
+          </a:prstGeom>
+          <a:ln>
+            <a:tailEnd type="triangle"/>
+          </a:ln>
+        </p:spPr>
+        <p:style>
+          <a:lnRef idx="1">
+            <a:schemeClr val="accent1"/>
+          </a:lnRef>
+          <a:fillRef idx="0">
+            <a:schemeClr val="accent1"/>
+          </a:fillRef>
+          <a:effectRef idx="0">
+            <a:schemeClr val="accent1"/>
+          </a:effectRef>
+          <a:fontRef idx="minor">
+            <a:schemeClr val="tx1"/>
+          </a:fontRef>
+        </p:style>
+      </p:cxnSp>
+      <p:sp>
+        <p:nvSpPr>
+          <p:cNvPr id="62" name="Flowchart: Document 61">
+            <a:extLst>
+              <a:ext uri="{FF2B5EF4-FFF2-40B4-BE49-F238E27FC236}">
+                <a16:creationId xmlns:a16="http://schemas.microsoft.com/office/drawing/2014/main" id="{62F32C92-A6B9-4361-8F55-3A8D9E008A0B}"/>
+              </a:ext>
+            </a:extLst>
+          </p:cNvPr>
+          <p:cNvSpPr/>
+          <p:nvPr/>
+        </p:nvSpPr>
+        <p:spPr>
+          <a:xfrm>
+            <a:off x="6953441" y="2043508"/>
+            <a:ext cx="1079700" cy="622225"/>
+          </a:xfrm>
+          <a:prstGeom prst="flowChartDocument">
+            <a:avLst/>
+          </a:prstGeom>
+        </p:spPr>
+        <p:style>
+          <a:lnRef idx="2">
+            <a:schemeClr val="accent1"/>
+          </a:lnRef>
+          <a:fillRef idx="1">
+            <a:schemeClr val="lt1"/>
+          </a:fillRef>
+          <a:effectRef idx="0">
+            <a:schemeClr val="accent1"/>
+          </a:effectRef>
+          <a:fontRef idx="minor">
+            <a:schemeClr val="dk1"/>
+          </a:fontRef>
+        </p:style>
+        <p:txBody>
+          <a:bodyPr rtlCol="0" anchor="ctr"/>
+          <a:lstStyle/>
+          <a:p>
+            <a:pPr algn="ctr"/>
+            <a:r>
+              <a:rPr lang="en-US" sz="1000" dirty="0" err="1"/>
+              <a:t>countries.json</a:t>
+            </a:r>
+            <a:endParaRPr lang="en-US" sz="1000" dirty="0"/>
+          </a:p>
+        </p:txBody>
+      </p:sp>
+      <p:cxnSp>
+        <p:nvCxnSpPr>
+          <p:cNvPr id="46" name="Connector: Elbow 45">
+            <a:extLst>
+              <a:ext uri="{FF2B5EF4-FFF2-40B4-BE49-F238E27FC236}">
+                <a16:creationId xmlns:a16="http://schemas.microsoft.com/office/drawing/2014/main" id="{E32FC78B-FF76-46C5-BFC2-275588129C34}"/>
+              </a:ext>
+            </a:extLst>
+          </p:cNvPr>
+          <p:cNvCxnSpPr>
+            <a:stCxn id="62" idx="1"/>
+            <a:endCxn id="8" idx="2"/>
+          </p:cNvCxnSpPr>
+          <p:nvPr/>
+        </p:nvCxnSpPr>
+        <p:spPr>
+          <a:xfrm rot="10800000">
+            <a:off x="5616245" y="1908163"/>
+            <a:ext cx="1337197" cy="446458"/>
           </a:xfrm>
           <a:prstGeom prst="bentConnector2">
             <a:avLst/>

</xml_diff>

<commit_message>
Added process description and files used to the README, and workflow file
</commit_message>
<xml_diff>
--- a/flowchart.pptx
+++ b/flowchart.pptx
@@ -259,7 +259,7 @@
           <a:p>
             <a:fld id="{E700A6F8-1C47-4BB8-A7F5-CF2765752BCF}" type="datetimeFigureOut">
               <a:rPr lang="en-US" smtClean="0"/>
-              <a:t>3/20/2022</a:t>
+              <a:t>3/21/2022</a:t>
             </a:fld>
             <a:endParaRPr lang="en-US"/>
           </a:p>
@@ -457,7 +457,7 @@
           <a:p>
             <a:fld id="{E700A6F8-1C47-4BB8-A7F5-CF2765752BCF}" type="datetimeFigureOut">
               <a:rPr lang="en-US" smtClean="0"/>
-              <a:t>3/20/2022</a:t>
+              <a:t>3/21/2022</a:t>
             </a:fld>
             <a:endParaRPr lang="en-US"/>
           </a:p>
@@ -665,7 +665,7 @@
           <a:p>
             <a:fld id="{E700A6F8-1C47-4BB8-A7F5-CF2765752BCF}" type="datetimeFigureOut">
               <a:rPr lang="en-US" smtClean="0"/>
-              <a:t>3/20/2022</a:t>
+              <a:t>3/21/2022</a:t>
             </a:fld>
             <a:endParaRPr lang="en-US"/>
           </a:p>
@@ -863,7 +863,7 @@
           <a:p>
             <a:fld id="{E700A6F8-1C47-4BB8-A7F5-CF2765752BCF}" type="datetimeFigureOut">
               <a:rPr lang="en-US" smtClean="0"/>
-              <a:t>3/20/2022</a:t>
+              <a:t>3/21/2022</a:t>
             </a:fld>
             <a:endParaRPr lang="en-US"/>
           </a:p>
@@ -1138,7 +1138,7 @@
           <a:p>
             <a:fld id="{E700A6F8-1C47-4BB8-A7F5-CF2765752BCF}" type="datetimeFigureOut">
               <a:rPr lang="en-US" smtClean="0"/>
-              <a:t>3/20/2022</a:t>
+              <a:t>3/21/2022</a:t>
             </a:fld>
             <a:endParaRPr lang="en-US"/>
           </a:p>
@@ -1403,7 +1403,7 @@
           <a:p>
             <a:fld id="{E700A6F8-1C47-4BB8-A7F5-CF2765752BCF}" type="datetimeFigureOut">
               <a:rPr lang="en-US" smtClean="0"/>
-              <a:t>3/20/2022</a:t>
+              <a:t>3/21/2022</a:t>
             </a:fld>
             <a:endParaRPr lang="en-US"/>
           </a:p>
@@ -1815,7 +1815,7 @@
           <a:p>
             <a:fld id="{E700A6F8-1C47-4BB8-A7F5-CF2765752BCF}" type="datetimeFigureOut">
               <a:rPr lang="en-US" smtClean="0"/>
-              <a:t>3/20/2022</a:t>
+              <a:t>3/21/2022</a:t>
             </a:fld>
             <a:endParaRPr lang="en-US"/>
           </a:p>
@@ -1956,7 +1956,7 @@
           <a:p>
             <a:fld id="{E700A6F8-1C47-4BB8-A7F5-CF2765752BCF}" type="datetimeFigureOut">
               <a:rPr lang="en-US" smtClean="0"/>
-              <a:t>3/20/2022</a:t>
+              <a:t>3/21/2022</a:t>
             </a:fld>
             <a:endParaRPr lang="en-US"/>
           </a:p>
@@ -2069,7 +2069,7 @@
           <a:p>
             <a:fld id="{E700A6F8-1C47-4BB8-A7F5-CF2765752BCF}" type="datetimeFigureOut">
               <a:rPr lang="en-US" smtClean="0"/>
-              <a:t>3/20/2022</a:t>
+              <a:t>3/21/2022</a:t>
             </a:fld>
             <a:endParaRPr lang="en-US"/>
           </a:p>
@@ -2380,7 +2380,7 @@
           <a:p>
             <a:fld id="{E700A6F8-1C47-4BB8-A7F5-CF2765752BCF}" type="datetimeFigureOut">
               <a:rPr lang="en-US" smtClean="0"/>
-              <a:t>3/20/2022</a:t>
+              <a:t>3/21/2022</a:t>
             </a:fld>
             <a:endParaRPr lang="en-US"/>
           </a:p>
@@ -2668,7 +2668,7 @@
           <a:p>
             <a:fld id="{E700A6F8-1C47-4BB8-A7F5-CF2765752BCF}" type="datetimeFigureOut">
               <a:rPr lang="en-US" smtClean="0"/>
-              <a:t>3/20/2022</a:t>
+              <a:t>3/21/2022</a:t>
             </a:fld>
             <a:endParaRPr lang="en-US"/>
           </a:p>
@@ -2909,7 +2909,7 @@
           <a:p>
             <a:fld id="{E700A6F8-1C47-4BB8-A7F5-CF2765752BCF}" type="datetimeFigureOut">
               <a:rPr lang="en-US" smtClean="0"/>
-              <a:t>3/20/2022</a:t>
+              <a:t>3/21/2022</a:t>
             </a:fld>
             <a:endParaRPr lang="en-US"/>
           </a:p>
@@ -3368,14 +3368,14 @@
             <a:pPr algn="ctr"/>
             <a:r>
               <a:rPr lang="en-US" sz="1200" dirty="0"/>
-              <a:t>Kaggle Twitter dataset</a:t>
+              <a:t>Kaggle Twitter datasets </a:t>
             </a:r>
           </a:p>
           <a:p>
             <a:pPr algn="ctr"/>
             <a:r>
               <a:rPr lang="en-US" sz="900" dirty="0"/>
-              <a:t>UkraineCombinedTweetsDeduped20220227-13166.csv</a:t>
+              <a:t>Multiple CSV files for different sets of dates</a:t>
             </a:r>
           </a:p>
         </p:txBody>
@@ -3429,8 +3429,8 @@
         </p:nvSpPr>
         <p:spPr>
           <a:xfrm>
-            <a:off x="4788341" y="863907"/>
-            <a:ext cx="1655805" cy="1044256"/>
+            <a:off x="4788342" y="698478"/>
+            <a:ext cx="1809308" cy="1325099"/>
           </a:xfrm>
           <a:prstGeom prst="flowChartProcess">
             <a:avLst/>
@@ -3457,7 +3457,7 @@
             <a:pPr algn="ctr"/>
             <a:r>
               <a:rPr lang="en-US" sz="1400" dirty="0"/>
-              <a:t>Preprocessing</a:t>
+              <a:t>Preprocessing &amp; Consolidating</a:t>
             </a:r>
           </a:p>
           <a:p>
@@ -3470,8 +3470,12 @@
           <a:p>
             <a:pPr algn="ctr"/>
             <a:r>
+              <a:rPr lang="en-US" sz="900"/>
+              <a:t>sentiment</a:t>
+            </a:r>
+            <a:r>
               <a:rPr lang="en-US" sz="900" dirty="0" err="1"/>
-              <a:t>Twitter_vader_sentiment_analysis.ipynb</a:t>
+              <a:t>_analysis.ipynb</a:t>
             </a:r>
             <a:endParaRPr lang="en-US" sz="900" dirty="0"/>
           </a:p>
@@ -3803,12 +3807,8 @@
           <a:p>
             <a:pPr algn="ctr"/>
             <a:r>
-              <a:rPr lang="en-US" sz="1100" dirty="0"/>
-              <a:t>___.</a:t>
-            </a:r>
-            <a:r>
               <a:rPr lang="en-US" sz="1100" dirty="0" err="1"/>
-              <a:t>ipynb</a:t>
+              <a:t>stats.ipynb</a:t>
             </a:r>
             <a:endParaRPr lang="en-US" sz="1100" dirty="0"/>
           </a:p>
@@ -5172,6 +5172,7 @@
             </a:extLst>
           </p:cNvPr>
           <p:cNvCxnSpPr>
+            <a:cxnSpLocks/>
             <a:stCxn id="62" idx="1"/>
             <a:endCxn id="8" idx="2"/>
           </p:cNvCxnSpPr>
@@ -5179,8 +5180,8 @@
         </p:nvCxnSpPr>
         <p:spPr>
           <a:xfrm rot="10800000">
-            <a:off x="5616245" y="1908163"/>
-            <a:ext cx="1337197" cy="446458"/>
+            <a:off x="5692997" y="2023577"/>
+            <a:ext cx="1260445" cy="331044"/>
           </a:xfrm>
           <a:prstGeom prst="bentConnector2">
             <a:avLst/>

</xml_diff>

<commit_message>
updating data join process in workflow
</commit_message>
<xml_diff>
--- a/flowchart.pptx
+++ b/flowchart.pptx
@@ -259,7 +259,7 @@
           <a:p>
             <a:fld id="{E700A6F8-1C47-4BB8-A7F5-CF2765752BCF}" type="datetimeFigureOut">
               <a:rPr lang="en-US" smtClean="0"/>
-              <a:t>3/21/2022</a:t>
+              <a:t>3/22/2022</a:t>
             </a:fld>
             <a:endParaRPr lang="en-US"/>
           </a:p>
@@ -457,7 +457,7 @@
           <a:p>
             <a:fld id="{E700A6F8-1C47-4BB8-A7F5-CF2765752BCF}" type="datetimeFigureOut">
               <a:rPr lang="en-US" smtClean="0"/>
-              <a:t>3/21/2022</a:t>
+              <a:t>3/22/2022</a:t>
             </a:fld>
             <a:endParaRPr lang="en-US"/>
           </a:p>
@@ -665,7 +665,7 @@
           <a:p>
             <a:fld id="{E700A6F8-1C47-4BB8-A7F5-CF2765752BCF}" type="datetimeFigureOut">
               <a:rPr lang="en-US" smtClean="0"/>
-              <a:t>3/21/2022</a:t>
+              <a:t>3/22/2022</a:t>
             </a:fld>
             <a:endParaRPr lang="en-US"/>
           </a:p>
@@ -863,7 +863,7 @@
           <a:p>
             <a:fld id="{E700A6F8-1C47-4BB8-A7F5-CF2765752BCF}" type="datetimeFigureOut">
               <a:rPr lang="en-US" smtClean="0"/>
-              <a:t>3/21/2022</a:t>
+              <a:t>3/22/2022</a:t>
             </a:fld>
             <a:endParaRPr lang="en-US"/>
           </a:p>
@@ -1138,7 +1138,7 @@
           <a:p>
             <a:fld id="{E700A6F8-1C47-4BB8-A7F5-CF2765752BCF}" type="datetimeFigureOut">
               <a:rPr lang="en-US" smtClean="0"/>
-              <a:t>3/21/2022</a:t>
+              <a:t>3/22/2022</a:t>
             </a:fld>
             <a:endParaRPr lang="en-US"/>
           </a:p>
@@ -1403,7 +1403,7 @@
           <a:p>
             <a:fld id="{E700A6F8-1C47-4BB8-A7F5-CF2765752BCF}" type="datetimeFigureOut">
               <a:rPr lang="en-US" smtClean="0"/>
-              <a:t>3/21/2022</a:t>
+              <a:t>3/22/2022</a:t>
             </a:fld>
             <a:endParaRPr lang="en-US"/>
           </a:p>
@@ -1815,7 +1815,7 @@
           <a:p>
             <a:fld id="{E700A6F8-1C47-4BB8-A7F5-CF2765752BCF}" type="datetimeFigureOut">
               <a:rPr lang="en-US" smtClean="0"/>
-              <a:t>3/21/2022</a:t>
+              <a:t>3/22/2022</a:t>
             </a:fld>
             <a:endParaRPr lang="en-US"/>
           </a:p>
@@ -1956,7 +1956,7 @@
           <a:p>
             <a:fld id="{E700A6F8-1C47-4BB8-A7F5-CF2765752BCF}" type="datetimeFigureOut">
               <a:rPr lang="en-US" smtClean="0"/>
-              <a:t>3/21/2022</a:t>
+              <a:t>3/22/2022</a:t>
             </a:fld>
             <a:endParaRPr lang="en-US"/>
           </a:p>
@@ -2069,7 +2069,7 @@
           <a:p>
             <a:fld id="{E700A6F8-1C47-4BB8-A7F5-CF2765752BCF}" type="datetimeFigureOut">
               <a:rPr lang="en-US" smtClean="0"/>
-              <a:t>3/21/2022</a:t>
+              <a:t>3/22/2022</a:t>
             </a:fld>
             <a:endParaRPr lang="en-US"/>
           </a:p>
@@ -2380,7 +2380,7 @@
           <a:p>
             <a:fld id="{E700A6F8-1C47-4BB8-A7F5-CF2765752BCF}" type="datetimeFigureOut">
               <a:rPr lang="en-US" smtClean="0"/>
-              <a:t>3/21/2022</a:t>
+              <a:t>3/22/2022</a:t>
             </a:fld>
             <a:endParaRPr lang="en-US"/>
           </a:p>
@@ -2668,7 +2668,7 @@
           <a:p>
             <a:fld id="{E700A6F8-1C47-4BB8-A7F5-CF2765752BCF}" type="datetimeFigureOut">
               <a:rPr lang="en-US" smtClean="0"/>
-              <a:t>3/21/2022</a:t>
+              <a:t>3/22/2022</a:t>
             </a:fld>
             <a:endParaRPr lang="en-US"/>
           </a:p>
@@ -2909,7 +2909,7 @@
           <a:p>
             <a:fld id="{E700A6F8-1C47-4BB8-A7F5-CF2765752BCF}" type="datetimeFigureOut">
               <a:rPr lang="en-US" smtClean="0"/>
-              <a:t>3/21/2022</a:t>
+              <a:t>3/22/2022</a:t>
             </a:fld>
             <a:endParaRPr lang="en-US"/>
           </a:p>
@@ -4133,8 +4133,13 @@
             <a:pPr algn="ctr"/>
             <a:r>
               <a:rPr lang="en-US" sz="1100" dirty="0"/>
-              <a:t>Using Postgres</a:t>
-            </a:r>
+              <a:t>Using </a:t>
+            </a:r>
+            <a:r>
+              <a:rPr lang="en-US" sz="1100"/>
+              <a:t>SQLAlchemy</a:t>
+            </a:r>
+            <a:endParaRPr lang="en-US" sz="1100" dirty="0"/>
           </a:p>
         </p:txBody>
       </p:sp>

</xml_diff>

<commit_message>
adding Tableau working file that uses SQLite database. updating README with file links. updating schema and workflow chart
</commit_message>
<xml_diff>
--- a/flowchart.pptx
+++ b/flowchart.pptx
@@ -259,7 +259,7 @@
           <a:p>
             <a:fld id="{E700A6F8-1C47-4BB8-A7F5-CF2765752BCF}" type="datetimeFigureOut">
               <a:rPr lang="en-US" smtClean="0"/>
-              <a:t>3/22/2022</a:t>
+              <a:t>3/26/2022</a:t>
             </a:fld>
             <a:endParaRPr lang="en-US"/>
           </a:p>
@@ -457,7 +457,7 @@
           <a:p>
             <a:fld id="{E700A6F8-1C47-4BB8-A7F5-CF2765752BCF}" type="datetimeFigureOut">
               <a:rPr lang="en-US" smtClean="0"/>
-              <a:t>3/22/2022</a:t>
+              <a:t>3/26/2022</a:t>
             </a:fld>
             <a:endParaRPr lang="en-US"/>
           </a:p>
@@ -665,7 +665,7 @@
           <a:p>
             <a:fld id="{E700A6F8-1C47-4BB8-A7F5-CF2765752BCF}" type="datetimeFigureOut">
               <a:rPr lang="en-US" smtClean="0"/>
-              <a:t>3/22/2022</a:t>
+              <a:t>3/26/2022</a:t>
             </a:fld>
             <a:endParaRPr lang="en-US"/>
           </a:p>
@@ -863,7 +863,7 @@
           <a:p>
             <a:fld id="{E700A6F8-1C47-4BB8-A7F5-CF2765752BCF}" type="datetimeFigureOut">
               <a:rPr lang="en-US" smtClean="0"/>
-              <a:t>3/22/2022</a:t>
+              <a:t>3/26/2022</a:t>
             </a:fld>
             <a:endParaRPr lang="en-US"/>
           </a:p>
@@ -1138,7 +1138,7 @@
           <a:p>
             <a:fld id="{E700A6F8-1C47-4BB8-A7F5-CF2765752BCF}" type="datetimeFigureOut">
               <a:rPr lang="en-US" smtClean="0"/>
-              <a:t>3/22/2022</a:t>
+              <a:t>3/26/2022</a:t>
             </a:fld>
             <a:endParaRPr lang="en-US"/>
           </a:p>
@@ -1403,7 +1403,7 @@
           <a:p>
             <a:fld id="{E700A6F8-1C47-4BB8-A7F5-CF2765752BCF}" type="datetimeFigureOut">
               <a:rPr lang="en-US" smtClean="0"/>
-              <a:t>3/22/2022</a:t>
+              <a:t>3/26/2022</a:t>
             </a:fld>
             <a:endParaRPr lang="en-US"/>
           </a:p>
@@ -1815,7 +1815,7 @@
           <a:p>
             <a:fld id="{E700A6F8-1C47-4BB8-A7F5-CF2765752BCF}" type="datetimeFigureOut">
               <a:rPr lang="en-US" smtClean="0"/>
-              <a:t>3/22/2022</a:t>
+              <a:t>3/26/2022</a:t>
             </a:fld>
             <a:endParaRPr lang="en-US"/>
           </a:p>
@@ -1956,7 +1956,7 @@
           <a:p>
             <a:fld id="{E700A6F8-1C47-4BB8-A7F5-CF2765752BCF}" type="datetimeFigureOut">
               <a:rPr lang="en-US" smtClean="0"/>
-              <a:t>3/22/2022</a:t>
+              <a:t>3/26/2022</a:t>
             </a:fld>
             <a:endParaRPr lang="en-US"/>
           </a:p>
@@ -2069,7 +2069,7 @@
           <a:p>
             <a:fld id="{E700A6F8-1C47-4BB8-A7F5-CF2765752BCF}" type="datetimeFigureOut">
               <a:rPr lang="en-US" smtClean="0"/>
-              <a:t>3/22/2022</a:t>
+              <a:t>3/26/2022</a:t>
             </a:fld>
             <a:endParaRPr lang="en-US"/>
           </a:p>
@@ -2380,7 +2380,7 @@
           <a:p>
             <a:fld id="{E700A6F8-1C47-4BB8-A7F5-CF2765752BCF}" type="datetimeFigureOut">
               <a:rPr lang="en-US" smtClean="0"/>
-              <a:t>3/22/2022</a:t>
+              <a:t>3/26/2022</a:t>
             </a:fld>
             <a:endParaRPr lang="en-US"/>
           </a:p>
@@ -2668,7 +2668,7 @@
           <a:p>
             <a:fld id="{E700A6F8-1C47-4BB8-A7F5-CF2765752BCF}" type="datetimeFigureOut">
               <a:rPr lang="en-US" smtClean="0"/>
-              <a:t>3/22/2022</a:t>
+              <a:t>3/26/2022</a:t>
             </a:fld>
             <a:endParaRPr lang="en-US"/>
           </a:p>
@@ -2909,7 +2909,7 @@
           <a:p>
             <a:fld id="{E700A6F8-1C47-4BB8-A7F5-CF2765752BCF}" type="datetimeFigureOut">
               <a:rPr lang="en-US" smtClean="0"/>
-              <a:t>3/22/2022</a:t>
+              <a:t>3/26/2022</a:t>
             </a:fld>
             <a:endParaRPr lang="en-US"/>
           </a:p>
@@ -3328,10 +3328,45 @@
       </p:grpSpPr>
       <p:sp>
         <p:nvSpPr>
-          <p:cNvPr id="4" name="Flowchart: Document 3">
-            <a:extLst>
-              <a:ext uri="{FF2B5EF4-FFF2-40B4-BE49-F238E27FC236}">
-                <a16:creationId xmlns:a16="http://schemas.microsoft.com/office/drawing/2014/main" id="{19DE6CB7-2E0E-428A-B99F-B119963BBDB9}"/>
+          <p:cNvPr id="7" name="TextBox 6">
+            <a:extLst>
+              <a:ext uri="{FF2B5EF4-FFF2-40B4-BE49-F238E27FC236}">
+                <a16:creationId xmlns:a16="http://schemas.microsoft.com/office/drawing/2014/main" id="{631024F8-3746-49E4-80EC-79FE8C3C89F1}"/>
+              </a:ext>
+            </a:extLst>
+          </p:cNvPr>
+          <p:cNvSpPr txBox="1"/>
+          <p:nvPr/>
+        </p:nvSpPr>
+        <p:spPr>
+          <a:xfrm>
+            <a:off x="4757270" y="231962"/>
+            <a:ext cx="2649508" cy="369332"/>
+          </a:xfrm>
+          <a:prstGeom prst="rect">
+            <a:avLst/>
+          </a:prstGeom>
+          <a:noFill/>
+        </p:spPr>
+        <p:txBody>
+          <a:bodyPr wrap="none" rtlCol="0">
+            <a:spAutoFit/>
+          </a:bodyPr>
+          <a:lstStyle/>
+          <a:p>
+            <a:r>
+              <a:rPr lang="en-US" dirty="0"/>
+              <a:t>Data Processing Flowchart</a:t>
+            </a:r>
+          </a:p>
+        </p:txBody>
+      </p:sp>
+      <p:sp>
+        <p:nvSpPr>
+          <p:cNvPr id="8" name="Flowchart: Process 7">
+            <a:extLst>
+              <a:ext uri="{FF2B5EF4-FFF2-40B4-BE49-F238E27FC236}">
+                <a16:creationId xmlns:a16="http://schemas.microsoft.com/office/drawing/2014/main" id="{15C018F6-05C9-493C-8A0C-2F3ED7BCF736}"/>
               </a:ext>
             </a:extLst>
           </p:cNvPr>
@@ -3340,10 +3375,10 @@
         </p:nvSpPr>
         <p:spPr>
           <a:xfrm>
-            <a:off x="462348" y="910858"/>
-            <a:ext cx="1312338" cy="966642"/>
-          </a:xfrm>
-          <a:prstGeom prst="flowChartDocument">
+            <a:off x="4788342" y="698478"/>
+            <a:ext cx="1809308" cy="1325099"/>
+          </a:xfrm>
+          <a:prstGeom prst="flowChartProcess">
             <a:avLst/>
           </a:prstGeom>
         </p:spPr>
@@ -3367,60 +3402,33 @@
           <a:p>
             <a:pPr algn="ctr"/>
             <a:r>
-              <a:rPr lang="en-US" sz="1200" dirty="0"/>
-              <a:t>Kaggle Twitter datasets </a:t>
+              <a:rPr lang="en-US" sz="1400" dirty="0"/>
+              <a:t>Preprocessing &amp; Consolidating</a:t>
             </a:r>
           </a:p>
           <a:p>
             <a:pPr algn="ctr"/>
             <a:r>
-              <a:rPr lang="en-US" sz="900" dirty="0"/>
-              <a:t>Multiple CSV files for different sets of dates</a:t>
-            </a:r>
-          </a:p>
-        </p:txBody>
-      </p:sp>
-      <p:sp>
-        <p:nvSpPr>
-          <p:cNvPr id="7" name="TextBox 6">
-            <a:extLst>
-              <a:ext uri="{FF2B5EF4-FFF2-40B4-BE49-F238E27FC236}">
-                <a16:creationId xmlns:a16="http://schemas.microsoft.com/office/drawing/2014/main" id="{631024F8-3746-49E4-80EC-79FE8C3C89F1}"/>
-              </a:ext>
-            </a:extLst>
-          </p:cNvPr>
-          <p:cNvSpPr txBox="1"/>
-          <p:nvPr/>
-        </p:nvSpPr>
-        <p:spPr>
-          <a:xfrm>
-            <a:off x="4757270" y="231962"/>
-            <a:ext cx="2649508" cy="369332"/>
-          </a:xfrm>
-          <a:prstGeom prst="rect">
-            <a:avLst/>
-          </a:prstGeom>
-          <a:noFill/>
-        </p:spPr>
-        <p:txBody>
-          <a:bodyPr wrap="none" rtlCol="0">
-            <a:spAutoFit/>
-          </a:bodyPr>
-          <a:lstStyle/>
-          <a:p>
-            <a:r>
-              <a:rPr lang="en-US" dirty="0"/>
-              <a:t>Data Processing Flowchart</a:t>
-            </a:r>
-          </a:p>
-        </p:txBody>
-      </p:sp>
-      <p:sp>
-        <p:nvSpPr>
-          <p:cNvPr id="8" name="Flowchart: Process 7">
-            <a:extLst>
-              <a:ext uri="{FF2B5EF4-FFF2-40B4-BE49-F238E27FC236}">
-                <a16:creationId xmlns:a16="http://schemas.microsoft.com/office/drawing/2014/main" id="{15C018F6-05C9-493C-8A0C-2F3ED7BCF736}"/>
+              <a:rPr lang="en-US" sz="1100" dirty="0"/>
+              <a:t>Filter by English lang, cleaning, convert location to country, add Lat &amp; Lon</a:t>
+            </a:r>
+          </a:p>
+          <a:p>
+            <a:pPr algn="ctr"/>
+            <a:r>
+              <a:rPr lang="en-US" sz="900" dirty="0" err="1"/>
+              <a:t>sentiment_analysis.ipynb</a:t>
+            </a:r>
+            <a:endParaRPr lang="en-US" sz="900" dirty="0"/>
+          </a:p>
+        </p:txBody>
+      </p:sp>
+      <p:sp>
+        <p:nvSpPr>
+          <p:cNvPr id="10" name="Flowchart: Process 9">
+            <a:extLst>
+              <a:ext uri="{FF2B5EF4-FFF2-40B4-BE49-F238E27FC236}">
+                <a16:creationId xmlns:a16="http://schemas.microsoft.com/office/drawing/2014/main" id="{335CBE6D-6AC5-4A99-B8CC-8C6E482A21EA}"/>
               </a:ext>
             </a:extLst>
           </p:cNvPr>
@@ -3429,8 +3437,8 @@
         </p:nvSpPr>
         <p:spPr>
           <a:xfrm>
-            <a:off x="4788342" y="698478"/>
-            <a:ext cx="1809308" cy="1325099"/>
+            <a:off x="10011422" y="910858"/>
+            <a:ext cx="1655805" cy="1044256"/>
           </a:xfrm>
           <a:prstGeom prst="flowChartProcess">
             <a:avLst/>
@@ -3457,36 +3465,29 @@
             <a:pPr algn="ctr"/>
             <a:r>
               <a:rPr lang="en-US" sz="1400" dirty="0"/>
-              <a:t>Preprocessing &amp; Consolidating</a:t>
+              <a:t>Sentiment Analysis</a:t>
             </a:r>
           </a:p>
           <a:p>
             <a:pPr algn="ctr"/>
             <a:r>
-              <a:rPr lang="en-US" sz="1100" dirty="0"/>
-              <a:t>Filter by English lang, cleaning, convert location to country, add Lat &amp; Lon</a:t>
-            </a:r>
+              <a:rPr lang="en-US" sz="900" dirty="0" err="1"/>
+              <a:t>Twitter_Vader_sentiment_analysis.ipynb</a:t>
+            </a:r>
+            <a:endParaRPr lang="en-US" sz="900" dirty="0"/>
           </a:p>
           <a:p>
             <a:pPr algn="ctr"/>
-            <a:r>
-              <a:rPr lang="en-US" sz="900"/>
-              <a:t>sentiment</a:t>
-            </a:r>
-            <a:r>
-              <a:rPr lang="en-US" sz="900" dirty="0" err="1"/>
-              <a:t>_analysis.ipynb</a:t>
-            </a:r>
-            <a:endParaRPr lang="en-US" sz="900" dirty="0"/>
-          </a:p>
-        </p:txBody>
-      </p:sp>
-      <p:sp>
-        <p:nvSpPr>
-          <p:cNvPr id="10" name="Flowchart: Process 9">
-            <a:extLst>
-              <a:ext uri="{FF2B5EF4-FFF2-40B4-BE49-F238E27FC236}">
-                <a16:creationId xmlns:a16="http://schemas.microsoft.com/office/drawing/2014/main" id="{335CBE6D-6AC5-4A99-B8CC-8C6E482A21EA}"/>
+            <a:endParaRPr lang="en-US" sz="1100" dirty="0"/>
+          </a:p>
+        </p:txBody>
+      </p:sp>
+      <p:sp>
+        <p:nvSpPr>
+          <p:cNvPr id="12" name="Flowchart: Document 11">
+            <a:extLst>
+              <a:ext uri="{FF2B5EF4-FFF2-40B4-BE49-F238E27FC236}">
+                <a16:creationId xmlns:a16="http://schemas.microsoft.com/office/drawing/2014/main" id="{3DED4EBD-884C-4A6F-9C97-A59041FDEAD1}"/>
               </a:ext>
             </a:extLst>
           </p:cNvPr>
@@ -3495,10 +3496,10 @@
         </p:nvSpPr>
         <p:spPr>
           <a:xfrm>
-            <a:off x="10011422" y="910858"/>
-            <a:ext cx="1655805" cy="1044256"/>
-          </a:xfrm>
-          <a:prstGeom prst="flowChartProcess">
+            <a:off x="802531" y="3947516"/>
+            <a:ext cx="1079700" cy="622225"/>
+          </a:xfrm>
+          <a:prstGeom prst="flowChartDocument">
             <a:avLst/>
           </a:prstGeom>
         </p:spPr>
@@ -3522,30 +3523,19 @@
           <a:p>
             <a:pPr algn="ctr"/>
             <a:r>
-              <a:rPr lang="en-US" sz="1400" dirty="0"/>
-              <a:t>Sentiment Analysis</a:t>
-            </a:r>
-          </a:p>
-          <a:p>
-            <a:pPr algn="ctr"/>
-            <a:r>
-              <a:rPr lang="en-US" sz="900" dirty="0" err="1"/>
-              <a:t>Twitter_Vader_sentiment_analysis.ipynb</a:t>
-            </a:r>
-            <a:endParaRPr lang="en-US" sz="900" dirty="0"/>
-          </a:p>
-          <a:p>
-            <a:pPr algn="ctr"/>
-            <a:endParaRPr lang="en-US" sz="1100" dirty="0"/>
-          </a:p>
-        </p:txBody>
-      </p:sp>
-      <p:sp>
-        <p:nvSpPr>
-          <p:cNvPr id="12" name="Flowchart: Document 11">
-            <a:extLst>
-              <a:ext uri="{FF2B5EF4-FFF2-40B4-BE49-F238E27FC236}">
-                <a16:creationId xmlns:a16="http://schemas.microsoft.com/office/drawing/2014/main" id="{3DED4EBD-884C-4A6F-9C97-A59041FDEAD1}"/>
+              <a:rPr lang="en-US" sz="1000" dirty="0" err="1"/>
+              <a:t>schema.sql</a:t>
+            </a:r>
+            <a:endParaRPr lang="en-US" sz="1000" dirty="0"/>
+          </a:p>
+        </p:txBody>
+      </p:sp>
+      <p:sp>
+        <p:nvSpPr>
+          <p:cNvPr id="13" name="Flowchart: Process 12">
+            <a:extLst>
+              <a:ext uri="{FF2B5EF4-FFF2-40B4-BE49-F238E27FC236}">
+                <a16:creationId xmlns:a16="http://schemas.microsoft.com/office/drawing/2014/main" id="{F8F50C93-FB12-4705-8C29-2B4C5F1372DD}"/>
               </a:ext>
             </a:extLst>
           </p:cNvPr>
@@ -3554,10 +3544,10 @@
         </p:nvSpPr>
         <p:spPr>
           <a:xfrm>
-            <a:off x="338886" y="3644956"/>
-            <a:ext cx="1079700" cy="622225"/>
-          </a:xfrm>
-          <a:prstGeom prst="flowChartDocument">
+            <a:off x="10223039" y="3818566"/>
+            <a:ext cx="1655805" cy="1044256"/>
+          </a:xfrm>
+          <a:prstGeom prst="flowChartProcess">
             <a:avLst/>
           </a:prstGeom>
         </p:spPr>
@@ -3581,19 +3571,33 @@
           <a:p>
             <a:pPr algn="ctr"/>
             <a:r>
-              <a:rPr lang="en-US" sz="1000" dirty="0" err="1"/>
-              <a:t>schema.sql</a:t>
-            </a:r>
-            <a:endParaRPr lang="en-US" sz="1000" dirty="0"/>
-          </a:p>
-        </p:txBody>
-      </p:sp>
-      <p:sp>
-        <p:nvSpPr>
-          <p:cNvPr id="13" name="Flowchart: Process 12">
-            <a:extLst>
-              <a:ext uri="{FF2B5EF4-FFF2-40B4-BE49-F238E27FC236}">
-                <a16:creationId xmlns:a16="http://schemas.microsoft.com/office/drawing/2014/main" id="{F8F50C93-FB12-4705-8C29-2B4C5F1372DD}"/>
+              <a:rPr lang="en-US" sz="1400" dirty="0"/>
+              <a:t>ML</a:t>
+            </a:r>
+          </a:p>
+          <a:p>
+            <a:pPr algn="ctr"/>
+            <a:r>
+              <a:rPr lang="en-US" sz="1400" dirty="0"/>
+              <a:t>3-model comparison</a:t>
+            </a:r>
+          </a:p>
+          <a:p>
+            <a:pPr algn="ctr"/>
+            <a:r>
+              <a:rPr lang="en-US" sz="1100" dirty="0" err="1"/>
+              <a:t>Machine_Learning.ipynb</a:t>
+            </a:r>
+            <a:endParaRPr lang="en-US" sz="1100" dirty="0"/>
+          </a:p>
+        </p:txBody>
+      </p:sp>
+      <p:sp>
+        <p:nvSpPr>
+          <p:cNvPr id="14" name="Flowchart: Document 13">
+            <a:extLst>
+              <a:ext uri="{FF2B5EF4-FFF2-40B4-BE49-F238E27FC236}">
+                <a16:creationId xmlns:a16="http://schemas.microsoft.com/office/drawing/2014/main" id="{5FBAC688-31CC-4F05-8905-71B21636DAB9}"/>
               </a:ext>
             </a:extLst>
           </p:cNvPr>
@@ -3602,10 +3606,10 @@
         </p:nvSpPr>
         <p:spPr>
           <a:xfrm>
-            <a:off x="10223039" y="3818566"/>
-            <a:ext cx="1655805" cy="1044256"/>
-          </a:xfrm>
-          <a:prstGeom prst="flowChartProcess">
+            <a:off x="10047579" y="2630433"/>
+            <a:ext cx="1186934" cy="641071"/>
+          </a:xfrm>
+          <a:prstGeom prst="flowChartDocument">
             <a:avLst/>
           </a:prstGeom>
         </p:spPr>
@@ -3629,79 +3633,9 @@
           <a:p>
             <a:pPr algn="ctr"/>
             <a:r>
-              <a:rPr lang="en-US" sz="1400" dirty="0"/>
-              <a:t>ML</a:t>
-            </a:r>
-          </a:p>
-          <a:p>
-            <a:pPr algn="ctr"/>
-            <a:r>
-              <a:rPr lang="en-US" sz="1400" dirty="0"/>
-              <a:t>3-model comparison</a:t>
-            </a:r>
-          </a:p>
-          <a:p>
-            <a:pPr algn="ctr"/>
-            <a:r>
-              <a:rPr lang="en-US" sz="1100" dirty="0" err="1"/>
-              <a:t>Machine_Learning.ipynb</a:t>
-            </a:r>
-            <a:endParaRPr lang="en-US" sz="1100" dirty="0"/>
-          </a:p>
-        </p:txBody>
-      </p:sp>
-      <p:sp>
-        <p:nvSpPr>
-          <p:cNvPr id="14" name="Flowchart: Document 13">
-            <a:extLst>
-              <a:ext uri="{FF2B5EF4-FFF2-40B4-BE49-F238E27FC236}">
-                <a16:creationId xmlns:a16="http://schemas.microsoft.com/office/drawing/2014/main" id="{5FBAC688-31CC-4F05-8905-71B21636DAB9}"/>
-              </a:ext>
-            </a:extLst>
-          </p:cNvPr>
-          <p:cNvSpPr/>
-          <p:nvPr/>
-        </p:nvSpPr>
-        <p:spPr>
-          <a:xfrm>
-            <a:off x="10047579" y="2630433"/>
-            <a:ext cx="1186934" cy="641071"/>
-          </a:xfrm>
-          <a:prstGeom prst="flowChartDocument">
-            <a:avLst/>
-          </a:prstGeom>
-        </p:spPr>
-        <p:style>
-          <a:lnRef idx="2">
-            <a:schemeClr val="accent1"/>
-          </a:lnRef>
-          <a:fillRef idx="1">
-            <a:schemeClr val="lt1"/>
-          </a:fillRef>
-          <a:effectRef idx="0">
-            <a:schemeClr val="accent1"/>
-          </a:effectRef>
-          <a:fontRef idx="minor">
-            <a:schemeClr val="dk1"/>
-          </a:fontRef>
-        </p:style>
-        <p:txBody>
-          <a:bodyPr rtlCol="0" anchor="ctr"/>
-          <a:lstStyle/>
-          <a:p>
-            <a:pPr algn="ctr"/>
-            <a:r>
               <a:rPr lang="en-US" sz="1000" dirty="0"/>
-              <a:t>Tweets_data.csv</a:t>
-            </a:r>
-          </a:p>
-          <a:p>
-            <a:pPr algn="ctr"/>
-            <a:r>
-              <a:rPr lang="en-US" sz="1000" dirty="0" err="1"/>
-              <a:t>Tweets_data.sqlite</a:t>
-            </a:r>
-            <a:endParaRPr lang="en-US" sz="1000" dirty="0"/>
+              <a:t>tweet_sentiments_consolidated.csv</a:t>
+            </a:r>
           </a:p>
         </p:txBody>
       </p:sp>
@@ -4079,8 +4013,13 @@
             <a:pPr algn="ctr"/>
             <a:r>
               <a:rPr lang="en-US" sz="900" dirty="0"/>
-              <a:t>Russia_losses_equipment_total.csv</a:t>
-            </a:r>
+              <a:t>+ UN Refugee Agency </a:t>
+            </a:r>
+            <a:r>
+              <a:rPr lang="en-US" sz="900"/>
+              <a:t>migration data</a:t>
+            </a:r>
+            <a:endParaRPr lang="en-US" sz="900" dirty="0"/>
           </a:p>
         </p:txBody>
       </p:sp>
@@ -4126,20 +4065,15 @@
             <a:pPr algn="ctr"/>
             <a:r>
               <a:rPr lang="en-US" sz="1400" dirty="0"/>
-              <a:t>Join on Date</a:t>
+              <a:t>Inner join on Date</a:t>
             </a:r>
           </a:p>
           <a:p>
             <a:pPr algn="ctr"/>
             <a:r>
               <a:rPr lang="en-US" sz="1100" dirty="0"/>
-              <a:t>Using </a:t>
-            </a:r>
-            <a:r>
-              <a:rPr lang="en-US" sz="1100"/>
-              <a:t>SQLAlchemy</a:t>
-            </a:r>
-            <a:endParaRPr lang="en-US" sz="1100" dirty="0"/>
+              <a:t>Using sqlite3</a:t>
+            </a:r>
           </a:p>
         </p:txBody>
       </p:sp>
@@ -4307,58 +4241,6 @@
       </p:cxnSp>
       <p:sp>
         <p:nvSpPr>
-          <p:cNvPr id="54" name="Flowchart: Magnetic Disk 53">
-            <a:extLst>
-              <a:ext uri="{FF2B5EF4-FFF2-40B4-BE49-F238E27FC236}">
-                <a16:creationId xmlns:a16="http://schemas.microsoft.com/office/drawing/2014/main" id="{BF216119-C450-418B-8C58-622F22D954C9}"/>
-              </a:ext>
-            </a:extLst>
-          </p:cNvPr>
-          <p:cNvSpPr/>
-          <p:nvPr/>
-        </p:nvSpPr>
-        <p:spPr>
-          <a:xfrm>
-            <a:off x="5374387" y="3485088"/>
-            <a:ext cx="1163289" cy="678406"/>
-          </a:xfrm>
-          <a:prstGeom prst="flowChartMagneticDisk">
-            <a:avLst/>
-          </a:prstGeom>
-        </p:spPr>
-        <p:style>
-          <a:lnRef idx="2">
-            <a:schemeClr val="accent1"/>
-          </a:lnRef>
-          <a:fillRef idx="1">
-            <a:schemeClr val="lt1"/>
-          </a:fillRef>
-          <a:effectRef idx="0">
-            <a:schemeClr val="accent1"/>
-          </a:effectRef>
-          <a:fontRef idx="minor">
-            <a:schemeClr val="dk1"/>
-          </a:fontRef>
-        </p:style>
-        <p:txBody>
-          <a:bodyPr rtlCol="0" anchor="ctr"/>
-          <a:lstStyle/>
-          <a:p>
-            <a:pPr algn="ctr"/>
-            <a:r>
-              <a:rPr lang="en-US" sz="1200" dirty="0"/>
-              <a:t>Postgres </a:t>
-            </a:r>
-            <a:r>
-              <a:rPr lang="en-US" sz="1200" dirty="0" err="1"/>
-              <a:t>db</a:t>
-            </a:r>
-            <a:endParaRPr lang="en-US" sz="1200" dirty="0"/>
-          </a:p>
-        </p:txBody>
-      </p:sp>
-      <p:sp>
-        <p:nvSpPr>
           <p:cNvPr id="55" name="Flowchart: Document 54">
             <a:extLst>
               <a:ext uri="{FF2B5EF4-FFF2-40B4-BE49-F238E27FC236}">
@@ -4422,8 +4304,8 @@
         </p:nvCxnSpPr>
         <p:spPr>
           <a:xfrm rot="5400000">
-            <a:off x="1816287" y="2130284"/>
-            <a:ext cx="577122" cy="2452223"/>
+            <a:off x="1896829" y="2513386"/>
+            <a:ext cx="879682" cy="1988578"/>
           </a:xfrm>
           <a:prstGeom prst="bentConnector3">
             <a:avLst/>
@@ -4457,15 +4339,16 @@
             </a:extLst>
           </p:cNvPr>
           <p:cNvCxnSpPr>
+            <a:cxnSpLocks/>
             <a:stCxn id="42" idx="2"/>
-            <a:endCxn id="54" idx="1"/>
+            <a:endCxn id="24" idx="0"/>
           </p:cNvCxnSpPr>
           <p:nvPr/>
         </p:nvCxnSpPr>
         <p:spPr>
           <a:xfrm rot="16200000" flipH="1">
-            <a:off x="4434868" y="1963924"/>
-            <a:ext cx="417254" cy="2625073"/>
+            <a:off x="3510516" y="2888277"/>
+            <a:ext cx="545174" cy="904288"/>
           </a:xfrm>
           <a:prstGeom prst="bentConnector3">
             <a:avLst>
@@ -4664,7 +4547,7 @@
             <a:pPr algn="ctr"/>
             <a:r>
               <a:rPr lang="en-US" sz="1400" dirty="0"/>
-              <a:t>Website</a:t>
+              <a:t>Tableau, website</a:t>
             </a:r>
           </a:p>
           <a:p>
@@ -4779,241 +4662,8 @@
         </p:nvCxnSpPr>
         <p:spPr>
           <a:xfrm>
-            <a:off x="4471489" y="5173934"/>
+            <a:off x="4275266" y="5237272"/>
             <a:ext cx="0" cy="162556"/>
-          </a:xfrm>
-          <a:prstGeom prst="straightConnector1">
-            <a:avLst/>
-          </a:prstGeom>
-          <a:ln>
-            <a:tailEnd type="triangle"/>
-          </a:ln>
-        </p:spPr>
-        <p:style>
-          <a:lnRef idx="1">
-            <a:schemeClr val="accent1"/>
-          </a:lnRef>
-          <a:fillRef idx="0">
-            <a:schemeClr val="accent1"/>
-          </a:fillRef>
-          <a:effectRef idx="0">
-            <a:schemeClr val="accent1"/>
-          </a:effectRef>
-          <a:fontRef idx="minor">
-            <a:schemeClr val="tx1"/>
-          </a:fontRef>
-        </p:style>
-      </p:cxnSp>
-      <p:sp>
-        <p:nvSpPr>
-          <p:cNvPr id="43" name="Flowchart: Document 42">
-            <a:extLst>
-              <a:ext uri="{FF2B5EF4-FFF2-40B4-BE49-F238E27FC236}">
-                <a16:creationId xmlns:a16="http://schemas.microsoft.com/office/drawing/2014/main" id="{CF79B3E1-B72C-40EA-84CF-789A19DDE180}"/>
-              </a:ext>
-            </a:extLst>
-          </p:cNvPr>
-          <p:cNvSpPr/>
-          <p:nvPr/>
-        </p:nvSpPr>
-        <p:spPr>
-          <a:xfrm>
-            <a:off x="3863398" y="4421958"/>
-            <a:ext cx="1079700" cy="622225"/>
-          </a:xfrm>
-          <a:prstGeom prst="flowChartDocument">
-            <a:avLst/>
-          </a:prstGeom>
-        </p:spPr>
-        <p:style>
-          <a:lnRef idx="2">
-            <a:schemeClr val="accent1"/>
-          </a:lnRef>
-          <a:fillRef idx="1">
-            <a:schemeClr val="lt1"/>
-          </a:fillRef>
-          <a:effectRef idx="0">
-            <a:schemeClr val="accent1"/>
-          </a:effectRef>
-          <a:fontRef idx="minor">
-            <a:schemeClr val="dk1"/>
-          </a:fontRef>
-        </p:style>
-        <p:txBody>
-          <a:bodyPr rtlCol="0" anchor="ctr"/>
-          <a:lstStyle/>
-          <a:p>
-            <a:pPr algn="ctr"/>
-            <a:r>
-              <a:rPr lang="en-US" sz="1000" dirty="0" err="1"/>
-              <a:t>final_data.json</a:t>
-            </a:r>
-            <a:endParaRPr lang="en-US" sz="1000" dirty="0"/>
-          </a:p>
-        </p:txBody>
-      </p:sp>
-      <p:cxnSp>
-        <p:nvCxnSpPr>
-          <p:cNvPr id="20" name="Connector: Elbow 19">
-            <a:extLst>
-              <a:ext uri="{FF2B5EF4-FFF2-40B4-BE49-F238E27FC236}">
-                <a16:creationId xmlns:a16="http://schemas.microsoft.com/office/drawing/2014/main" id="{6769D071-2B8E-4029-BB8E-8360B3B8C2C7}"/>
-              </a:ext>
-            </a:extLst>
-          </p:cNvPr>
-          <p:cNvCxnSpPr>
-            <a:stCxn id="16" idx="2"/>
-          </p:cNvCxnSpPr>
-          <p:nvPr/>
-        </p:nvCxnSpPr>
-        <p:spPr>
-          <a:xfrm rot="5400000">
-            <a:off x="5270843" y="4981875"/>
-            <a:ext cx="493935" cy="1119482"/>
-          </a:xfrm>
-          <a:prstGeom prst="bentConnector2">
-            <a:avLst/>
-          </a:prstGeom>
-          <a:ln>
-            <a:tailEnd type="triangle"/>
-          </a:ln>
-        </p:spPr>
-        <p:style>
-          <a:lnRef idx="1">
-            <a:schemeClr val="accent1"/>
-          </a:lnRef>
-          <a:fillRef idx="0">
-            <a:schemeClr val="accent1"/>
-          </a:fillRef>
-          <a:effectRef idx="0">
-            <a:schemeClr val="accent1"/>
-          </a:effectRef>
-          <a:fontRef idx="minor">
-            <a:schemeClr val="tx1"/>
-          </a:fontRef>
-        </p:style>
-      </p:cxnSp>
-      <p:sp>
-        <p:nvSpPr>
-          <p:cNvPr id="24" name="Rectangle 23">
-            <a:extLst>
-              <a:ext uri="{FF2B5EF4-FFF2-40B4-BE49-F238E27FC236}">
-                <a16:creationId xmlns:a16="http://schemas.microsoft.com/office/drawing/2014/main" id="{B18962FF-4CAD-4C77-A380-0640DFB3D7A2}"/>
-              </a:ext>
-            </a:extLst>
-          </p:cNvPr>
-          <p:cNvSpPr/>
-          <p:nvPr/>
-        </p:nvSpPr>
-        <p:spPr>
-          <a:xfrm>
-            <a:off x="3709245" y="3545849"/>
-            <a:ext cx="1286856" cy="548427"/>
-          </a:xfrm>
-          <a:prstGeom prst="rect">
-            <a:avLst/>
-          </a:prstGeom>
-        </p:spPr>
-        <p:style>
-          <a:lnRef idx="2">
-            <a:schemeClr val="accent1"/>
-          </a:lnRef>
-          <a:fillRef idx="1">
-            <a:schemeClr val="lt1"/>
-          </a:fillRef>
-          <a:effectRef idx="0">
-            <a:schemeClr val="accent1"/>
-          </a:effectRef>
-          <a:fontRef idx="minor">
-            <a:schemeClr val="dk1"/>
-          </a:fontRef>
-        </p:style>
-        <p:txBody>
-          <a:bodyPr rtlCol="0" anchor="ctr"/>
-          <a:lstStyle/>
-          <a:p>
-            <a:pPr algn="ctr"/>
-            <a:r>
-              <a:rPr lang="en-US" sz="1200" dirty="0"/>
-              <a:t>Conversion</a:t>
-            </a:r>
-          </a:p>
-          <a:p>
-            <a:pPr algn="ctr"/>
-            <a:r>
-              <a:rPr lang="en-US" sz="900" dirty="0" err="1"/>
-              <a:t>final_data.ipynb</a:t>
-            </a:r>
-            <a:endParaRPr lang="en-US" sz="900" dirty="0"/>
-          </a:p>
-        </p:txBody>
-      </p:sp>
-      <p:sp>
-        <p:nvSpPr>
-          <p:cNvPr id="56" name="Flowchart: Document 55">
-            <a:extLst>
-              <a:ext uri="{FF2B5EF4-FFF2-40B4-BE49-F238E27FC236}">
-                <a16:creationId xmlns:a16="http://schemas.microsoft.com/office/drawing/2014/main" id="{EFAC2A6C-5D31-43CA-A1C0-EE55D560E4E4}"/>
-              </a:ext>
-            </a:extLst>
-          </p:cNvPr>
-          <p:cNvSpPr/>
-          <p:nvPr/>
-        </p:nvSpPr>
-        <p:spPr>
-          <a:xfrm>
-            <a:off x="2395914" y="4421958"/>
-            <a:ext cx="1079700" cy="622225"/>
-          </a:xfrm>
-          <a:prstGeom prst="flowChartDocument">
-            <a:avLst/>
-          </a:prstGeom>
-        </p:spPr>
-        <p:style>
-          <a:lnRef idx="2">
-            <a:schemeClr val="accent1"/>
-          </a:lnRef>
-          <a:fillRef idx="1">
-            <a:schemeClr val="lt1"/>
-          </a:fillRef>
-          <a:effectRef idx="0">
-            <a:schemeClr val="accent1"/>
-          </a:effectRef>
-          <a:fontRef idx="minor">
-            <a:schemeClr val="dk1"/>
-          </a:fontRef>
-        </p:style>
-        <p:txBody>
-          <a:bodyPr rtlCol="0" anchor="ctr"/>
-          <a:lstStyle/>
-          <a:p>
-            <a:pPr algn="ctr"/>
-            <a:r>
-              <a:rPr lang="en-US" sz="1000" dirty="0" err="1"/>
-              <a:t>final_data.sqlite</a:t>
-            </a:r>
-            <a:endParaRPr lang="en-US" sz="1000" dirty="0"/>
-          </a:p>
-        </p:txBody>
-      </p:sp>
-      <p:cxnSp>
-        <p:nvCxnSpPr>
-          <p:cNvPr id="34" name="Straight Arrow Connector 33">
-            <a:extLst>
-              <a:ext uri="{FF2B5EF4-FFF2-40B4-BE49-F238E27FC236}">
-                <a16:creationId xmlns:a16="http://schemas.microsoft.com/office/drawing/2014/main" id="{3E2A86F9-DC53-449C-AA75-8FA77CCEE70A}"/>
-              </a:ext>
-            </a:extLst>
-          </p:cNvPr>
-          <p:cNvCxnSpPr>
-            <a:stCxn id="54" idx="2"/>
-          </p:cNvCxnSpPr>
-          <p:nvPr/>
-        </p:nvCxnSpPr>
-        <p:spPr>
-          <a:xfrm flipH="1" flipV="1">
-            <a:off x="5063468" y="3818566"/>
-            <a:ext cx="310919" cy="5725"/>
           </a:xfrm>
           <a:prstGeom prst="straightConnector1">
             <a:avLst/>
@@ -5039,6 +4689,150 @@
       </p:cxnSp>
       <p:cxnSp>
         <p:nvCxnSpPr>
+          <p:cNvPr id="20" name="Connector: Elbow 19">
+            <a:extLst>
+              <a:ext uri="{FF2B5EF4-FFF2-40B4-BE49-F238E27FC236}">
+                <a16:creationId xmlns:a16="http://schemas.microsoft.com/office/drawing/2014/main" id="{6769D071-2B8E-4029-BB8E-8360B3B8C2C7}"/>
+              </a:ext>
+            </a:extLst>
+          </p:cNvPr>
+          <p:cNvCxnSpPr>
+            <a:stCxn id="16" idx="2"/>
+          </p:cNvCxnSpPr>
+          <p:nvPr/>
+        </p:nvCxnSpPr>
+        <p:spPr>
+          <a:xfrm rot="5400000">
+            <a:off x="5270843" y="4981875"/>
+            <a:ext cx="493935" cy="1119482"/>
+          </a:xfrm>
+          <a:prstGeom prst="bentConnector2">
+            <a:avLst/>
+          </a:prstGeom>
+          <a:ln>
+            <a:tailEnd type="triangle"/>
+          </a:ln>
+        </p:spPr>
+        <p:style>
+          <a:lnRef idx="1">
+            <a:schemeClr val="accent1"/>
+          </a:lnRef>
+          <a:fillRef idx="0">
+            <a:schemeClr val="accent1"/>
+          </a:fillRef>
+          <a:effectRef idx="0">
+            <a:schemeClr val="accent1"/>
+          </a:effectRef>
+          <a:fontRef idx="minor">
+            <a:schemeClr val="tx1"/>
+          </a:fontRef>
+        </p:style>
+      </p:cxnSp>
+      <p:sp>
+        <p:nvSpPr>
+          <p:cNvPr id="24" name="Rectangle 23">
+            <a:extLst>
+              <a:ext uri="{FF2B5EF4-FFF2-40B4-BE49-F238E27FC236}">
+                <a16:creationId xmlns:a16="http://schemas.microsoft.com/office/drawing/2014/main" id="{B18962FF-4CAD-4C77-A380-0640DFB3D7A2}"/>
+              </a:ext>
+            </a:extLst>
+          </p:cNvPr>
+          <p:cNvSpPr/>
+          <p:nvPr/>
+        </p:nvSpPr>
+        <p:spPr>
+          <a:xfrm>
+            <a:off x="3591819" y="3613008"/>
+            <a:ext cx="1286856" cy="548427"/>
+          </a:xfrm>
+          <a:prstGeom prst="rect">
+            <a:avLst/>
+          </a:prstGeom>
+        </p:spPr>
+        <p:style>
+          <a:lnRef idx="2">
+            <a:schemeClr val="accent1"/>
+          </a:lnRef>
+          <a:fillRef idx="1">
+            <a:schemeClr val="lt1"/>
+          </a:fillRef>
+          <a:effectRef idx="0">
+            <a:schemeClr val="accent1"/>
+          </a:effectRef>
+          <a:fontRef idx="minor">
+            <a:schemeClr val="dk1"/>
+          </a:fontRef>
+        </p:style>
+        <p:txBody>
+          <a:bodyPr rtlCol="0" anchor="ctr"/>
+          <a:lstStyle/>
+          <a:p>
+            <a:pPr algn="ctr"/>
+            <a:r>
+              <a:rPr lang="en-US" sz="1200" dirty="0"/>
+              <a:t>Conversion</a:t>
+            </a:r>
+          </a:p>
+          <a:p>
+            <a:pPr algn="ctr"/>
+            <a:r>
+              <a:rPr lang="en-US" sz="900" dirty="0" err="1"/>
+              <a:t>SQL_database.ipynb</a:t>
+            </a:r>
+            <a:endParaRPr lang="en-US" sz="900" dirty="0"/>
+          </a:p>
+        </p:txBody>
+      </p:sp>
+      <p:sp>
+        <p:nvSpPr>
+          <p:cNvPr id="56" name="Flowchart: Document 55">
+            <a:extLst>
+              <a:ext uri="{FF2B5EF4-FFF2-40B4-BE49-F238E27FC236}">
+                <a16:creationId xmlns:a16="http://schemas.microsoft.com/office/drawing/2014/main" id="{EFAC2A6C-5D31-43CA-A1C0-EE55D560E4E4}"/>
+              </a:ext>
+            </a:extLst>
+          </p:cNvPr>
+          <p:cNvSpPr/>
+          <p:nvPr/>
+        </p:nvSpPr>
+        <p:spPr>
+          <a:xfrm>
+            <a:off x="3591819" y="4585853"/>
+            <a:ext cx="1079700" cy="622225"/>
+          </a:xfrm>
+          <a:prstGeom prst="flowChartDocument">
+            <a:avLst/>
+          </a:prstGeom>
+        </p:spPr>
+        <p:style>
+          <a:lnRef idx="2">
+            <a:schemeClr val="accent1"/>
+          </a:lnRef>
+          <a:fillRef idx="1">
+            <a:schemeClr val="lt1"/>
+          </a:fillRef>
+          <a:effectRef idx="0">
+            <a:schemeClr val="accent1"/>
+          </a:effectRef>
+          <a:fontRef idx="minor">
+            <a:schemeClr val="dk1"/>
+          </a:fontRef>
+        </p:style>
+        <p:txBody>
+          <a:bodyPr rtlCol="0" anchor="ctr"/>
+          <a:lstStyle/>
+          <a:p>
+            <a:pPr algn="ctr"/>
+            <a:r>
+              <a:rPr lang="en-US" sz="1000" dirty="0" err="1"/>
+              <a:t>ukraine_analysis.sqlite</a:t>
+            </a:r>
+            <a:endParaRPr lang="en-US" sz="1000" dirty="0"/>
+          </a:p>
+        </p:txBody>
+      </p:sp>
+      <p:cxnSp>
+        <p:nvCxnSpPr>
           <p:cNvPr id="36" name="Straight Arrow Connector 35">
             <a:extLst>
               <a:ext uri="{FF2B5EF4-FFF2-40B4-BE49-F238E27FC236}">
@@ -5053,7 +4847,7 @@
         </p:nvCxnSpPr>
         <p:spPr>
           <a:xfrm>
-            <a:off x="4352673" y="4094276"/>
+            <a:off x="4235247" y="4161435"/>
             <a:ext cx="0" cy="218952"/>
           </a:xfrm>
           <a:prstGeom prst="straightConnector1">
@@ -5078,53 +4872,12 @@
           </a:fontRef>
         </p:style>
       </p:cxnSp>
-      <p:cxnSp>
-        <p:nvCxnSpPr>
-          <p:cNvPr id="39" name="Connector: Elbow 38">
-            <a:extLst>
-              <a:ext uri="{FF2B5EF4-FFF2-40B4-BE49-F238E27FC236}">
-                <a16:creationId xmlns:a16="http://schemas.microsoft.com/office/drawing/2014/main" id="{637F8C8A-4847-442C-BBEA-BF9E957CFB17}"/>
-              </a:ext>
-            </a:extLst>
-          </p:cNvPr>
-          <p:cNvCxnSpPr>
-            <a:endCxn id="56" idx="0"/>
-          </p:cNvCxnSpPr>
-          <p:nvPr/>
-        </p:nvCxnSpPr>
-        <p:spPr>
-          <a:xfrm rot="10800000" flipV="1">
-            <a:off x="2935764" y="4094276"/>
-            <a:ext cx="1115008" cy="327682"/>
-          </a:xfrm>
-          <a:prstGeom prst="bentConnector2">
-            <a:avLst/>
-          </a:prstGeom>
-          <a:ln>
-            <a:tailEnd type="triangle"/>
-          </a:ln>
-        </p:spPr>
-        <p:style>
-          <a:lnRef idx="1">
-            <a:schemeClr val="accent1"/>
-          </a:lnRef>
-          <a:fillRef idx="0">
-            <a:schemeClr val="accent1"/>
-          </a:fillRef>
-          <a:effectRef idx="0">
-            <a:schemeClr val="accent1"/>
-          </a:effectRef>
-          <a:fontRef idx="minor">
-            <a:schemeClr val="tx1"/>
-          </a:fontRef>
-        </p:style>
-      </p:cxnSp>
-      <p:sp>
-        <p:nvSpPr>
-          <p:cNvPr id="62" name="Flowchart: Document 61">
-            <a:extLst>
-              <a:ext uri="{FF2B5EF4-FFF2-40B4-BE49-F238E27FC236}">
-                <a16:creationId xmlns:a16="http://schemas.microsoft.com/office/drawing/2014/main" id="{62F32C92-A6B9-4361-8F55-3A8D9E008A0B}"/>
+      <p:sp>
+        <p:nvSpPr>
+          <p:cNvPr id="2" name="Flowchart: Multidocument 1">
+            <a:extLst>
+              <a:ext uri="{FF2B5EF4-FFF2-40B4-BE49-F238E27FC236}">
+                <a16:creationId xmlns:a16="http://schemas.microsoft.com/office/drawing/2014/main" id="{DBA2DBF7-BF1C-43BA-AB5D-0F34AFD2528E}"/>
               </a:ext>
             </a:extLst>
           </p:cNvPr>
@@ -5133,10 +4886,10 @@
         </p:nvSpPr>
         <p:spPr>
           <a:xfrm>
-            <a:off x="6953441" y="2043508"/>
-            <a:ext cx="1079700" cy="622225"/>
-          </a:xfrm>
-          <a:prstGeom prst="flowChartDocument">
+            <a:off x="218631" y="356644"/>
+            <a:ext cx="1731154" cy="1325097"/>
+          </a:xfrm>
+          <a:prstGeom prst="flowChartMultidocument">
             <a:avLst/>
           </a:prstGeom>
         </p:spPr>
@@ -5159,57 +4912,28 @@
           <a:lstStyle/>
           <a:p>
             <a:pPr algn="ctr"/>
-            <a:r>
-              <a:rPr lang="en-US" sz="1000" dirty="0" err="1"/>
-              <a:t>countries.json</a:t>
-            </a:r>
-            <a:endParaRPr lang="en-US" sz="1000" dirty="0"/>
-          </a:p>
-        </p:txBody>
-      </p:sp>
-      <p:cxnSp>
-        <p:nvCxnSpPr>
-          <p:cNvPr id="46" name="Connector: Elbow 45">
-            <a:extLst>
-              <a:ext uri="{FF2B5EF4-FFF2-40B4-BE49-F238E27FC236}">
-                <a16:creationId xmlns:a16="http://schemas.microsoft.com/office/drawing/2014/main" id="{E32FC78B-FF76-46C5-BFC2-275588129C34}"/>
-              </a:ext>
-            </a:extLst>
-          </p:cNvPr>
-          <p:cNvCxnSpPr>
-            <a:cxnSpLocks/>
-            <a:stCxn id="62" idx="1"/>
-            <a:endCxn id="8" idx="2"/>
-          </p:cNvCxnSpPr>
-          <p:nvPr/>
-        </p:nvCxnSpPr>
-        <p:spPr>
-          <a:xfrm rot="10800000">
-            <a:off x="5692997" y="2023577"/>
-            <a:ext cx="1260445" cy="331044"/>
-          </a:xfrm>
-          <a:prstGeom prst="bentConnector2">
-            <a:avLst/>
-          </a:prstGeom>
-          <a:ln>
-            <a:tailEnd type="triangle"/>
-          </a:ln>
-        </p:spPr>
-        <p:style>
-          <a:lnRef idx="1">
-            <a:schemeClr val="accent1"/>
-          </a:lnRef>
-          <a:fillRef idx="0">
-            <a:schemeClr val="accent1"/>
-          </a:fillRef>
-          <a:effectRef idx="0">
-            <a:schemeClr val="accent1"/>
-          </a:effectRef>
-          <a:fontRef idx="minor">
-            <a:schemeClr val="tx1"/>
-          </a:fontRef>
-        </p:style>
-      </p:cxnSp>
+            <a:endParaRPr lang="en-US" sz="1400" dirty="0"/>
+          </a:p>
+          <a:p>
+            <a:pPr algn="ctr"/>
+            <a:r>
+              <a:rPr lang="en-US" sz="1400" dirty="0"/>
+              <a:t>Kaggle Twitter datasets </a:t>
+            </a:r>
+          </a:p>
+          <a:p>
+            <a:pPr algn="ctr"/>
+            <a:r>
+              <a:rPr lang="en-US" sz="1100" dirty="0"/>
+              <a:t>Multiple CSV files for different dates</a:t>
+            </a:r>
+          </a:p>
+          <a:p>
+            <a:pPr algn="ctr"/>
+            <a:endParaRPr lang="en-US" dirty="0"/>
+          </a:p>
+        </p:txBody>
+      </p:sp>
     </p:spTree>
     <p:extLst>
       <p:ext uri="{BB962C8B-B14F-4D97-AF65-F5344CB8AC3E}">

</xml_diff>